<commit_message>
finalizes the one-fileRPSConsole app with classes
</commit_message>
<xml_diff>
--- a/Marks Drawings.pptx
+++ b/Marks Drawings.pptx
@@ -2309,7 +2309,7 @@
           <a:p>
             <a:fld id="{8415B7D3-8679-45B1-95C7-B5CD651E1E0B}" type="datetimeFigureOut">
               <a:rPr lang="en-US" smtClean="0"/>
-              <a:t>7/25/2022</a:t>
+              <a:t>7/26/2022</a:t>
             </a:fld>
             <a:endParaRPr lang="en-US"/>
           </a:p>
@@ -2507,7 +2507,7 @@
           <a:p>
             <a:fld id="{8415B7D3-8679-45B1-95C7-B5CD651E1E0B}" type="datetimeFigureOut">
               <a:rPr lang="en-US" smtClean="0"/>
-              <a:t>7/25/2022</a:t>
+              <a:t>7/26/2022</a:t>
             </a:fld>
             <a:endParaRPr lang="en-US"/>
           </a:p>
@@ -2715,7 +2715,7 @@
           <a:p>
             <a:fld id="{8415B7D3-8679-45B1-95C7-B5CD651E1E0B}" type="datetimeFigureOut">
               <a:rPr lang="en-US" smtClean="0"/>
-              <a:t>7/25/2022</a:t>
+              <a:t>7/26/2022</a:t>
             </a:fld>
             <a:endParaRPr lang="en-US"/>
           </a:p>
@@ -2913,7 +2913,7 @@
           <a:p>
             <a:fld id="{8415B7D3-8679-45B1-95C7-B5CD651E1E0B}" type="datetimeFigureOut">
               <a:rPr lang="en-US" smtClean="0"/>
-              <a:t>7/25/2022</a:t>
+              <a:t>7/26/2022</a:t>
             </a:fld>
             <a:endParaRPr lang="en-US"/>
           </a:p>
@@ -3188,7 +3188,7 @@
           <a:p>
             <a:fld id="{8415B7D3-8679-45B1-95C7-B5CD651E1E0B}" type="datetimeFigureOut">
               <a:rPr lang="en-US" smtClean="0"/>
-              <a:t>7/25/2022</a:t>
+              <a:t>7/26/2022</a:t>
             </a:fld>
             <a:endParaRPr lang="en-US"/>
           </a:p>
@@ -3453,7 +3453,7 @@
           <a:p>
             <a:fld id="{8415B7D3-8679-45B1-95C7-B5CD651E1E0B}" type="datetimeFigureOut">
               <a:rPr lang="en-US" smtClean="0"/>
-              <a:t>7/25/2022</a:t>
+              <a:t>7/26/2022</a:t>
             </a:fld>
             <a:endParaRPr lang="en-US"/>
           </a:p>
@@ -3865,7 +3865,7 @@
           <a:p>
             <a:fld id="{8415B7D3-8679-45B1-95C7-B5CD651E1E0B}" type="datetimeFigureOut">
               <a:rPr lang="en-US" smtClean="0"/>
-              <a:t>7/25/2022</a:t>
+              <a:t>7/26/2022</a:t>
             </a:fld>
             <a:endParaRPr lang="en-US"/>
           </a:p>
@@ -4006,7 +4006,7 @@
           <a:p>
             <a:fld id="{8415B7D3-8679-45B1-95C7-B5CD651E1E0B}" type="datetimeFigureOut">
               <a:rPr lang="en-US" smtClean="0"/>
-              <a:t>7/25/2022</a:t>
+              <a:t>7/26/2022</a:t>
             </a:fld>
             <a:endParaRPr lang="en-US"/>
           </a:p>
@@ -4119,7 +4119,7 @@
           <a:p>
             <a:fld id="{8415B7D3-8679-45B1-95C7-B5CD651E1E0B}" type="datetimeFigureOut">
               <a:rPr lang="en-US" smtClean="0"/>
-              <a:t>7/25/2022</a:t>
+              <a:t>7/26/2022</a:t>
             </a:fld>
             <a:endParaRPr lang="en-US"/>
           </a:p>
@@ -4430,7 +4430,7 @@
           <a:p>
             <a:fld id="{8415B7D3-8679-45B1-95C7-B5CD651E1E0B}" type="datetimeFigureOut">
               <a:rPr lang="en-US" smtClean="0"/>
-              <a:t>7/25/2022</a:t>
+              <a:t>7/26/2022</a:t>
             </a:fld>
             <a:endParaRPr lang="en-US"/>
           </a:p>
@@ -4718,7 +4718,7 @@
           <a:p>
             <a:fld id="{8415B7D3-8679-45B1-95C7-B5CD651E1E0B}" type="datetimeFigureOut">
               <a:rPr lang="en-US" smtClean="0"/>
-              <a:t>7/25/2022</a:t>
+              <a:t>7/26/2022</a:t>
             </a:fld>
             <a:endParaRPr lang="en-US"/>
           </a:p>
@@ -4959,7 +4959,7 @@
           <a:p>
             <a:fld id="{8415B7D3-8679-45B1-95C7-B5CD651E1E0B}" type="datetimeFigureOut">
               <a:rPr lang="en-US" smtClean="0"/>
-              <a:t>7/25/2022</a:t>
+              <a:t>7/26/2022</a:t>
             </a:fld>
             <a:endParaRPr lang="en-US"/>
           </a:p>
@@ -9727,7 +9727,7 @@
             <p:ph idx="1"/>
             <p:extLst>
               <p:ext uri="{D42A27DB-BD31-4B8C-83A1-F6EECF244321}">
-                <p14:modId xmlns:p14="http://schemas.microsoft.com/office/powerpoint/2010/main" val="774597943"/>
+                <p14:modId xmlns:p14="http://schemas.microsoft.com/office/powerpoint/2010/main" val="2271130823"/>
               </p:ext>
             </p:extLst>
           </p:nvPr>
@@ -10097,7 +10097,14 @@
                     <a:bodyPr/>
                     <a:lstStyle/>
                     <a:p>
-                      <a:endParaRPr lang="en-US" dirty="0"/>
+                      <a:r>
+                        <a:rPr lang="en-US" dirty="0">
+                          <a:solidFill>
+                            <a:srgbClr val="FF0000"/>
+                          </a:solidFill>
+                        </a:rPr>
+                        <a:t>P1</a:t>
+                      </a:r>
                     </a:p>
                   </a:txBody>
                   <a:tcPr/>
@@ -10150,7 +10157,14 @@
                     <a:bodyPr/>
                     <a:lstStyle/>
                     <a:p>
-                      <a:endParaRPr lang="en-US" dirty="0"/>
+                      <a:r>
+                        <a:rPr lang="en-US" dirty="0">
+                          <a:solidFill>
+                            <a:srgbClr val="FF0000"/>
+                          </a:solidFill>
+                        </a:rPr>
+                        <a:t>p2</a:t>
+                      </a:r>
                     </a:p>
                   </a:txBody>
                   <a:tcPr/>

</xml_diff>

<commit_message>
uodates coding challenges again
</commit_message>
<xml_diff>
--- a/Marks Drawings.pptx
+++ b/Marks Drawings.pptx
@@ -10,6 +10,7 @@
     <p:sldId id="258" r:id="rId4"/>
     <p:sldId id="259" r:id="rId5"/>
     <p:sldId id="260" r:id="rId6"/>
+    <p:sldId id="261" r:id="rId7"/>
   </p:sldIdLst>
   <p:sldSz cx="12192000" cy="6858000"/>
   <p:notesSz cx="6858000" cy="9144000"/>
@@ -5940,7 +5941,7 @@
           <a:p>
             <a:fld id="{8415B7D3-8679-45B1-95C7-B5CD651E1E0B}" type="datetimeFigureOut">
               <a:rPr lang="en-US" smtClean="0"/>
-              <a:t>7/27/2022</a:t>
+              <a:t>7/28/2022</a:t>
             </a:fld>
             <a:endParaRPr lang="en-US"/>
           </a:p>
@@ -6138,7 +6139,7 @@
           <a:p>
             <a:fld id="{8415B7D3-8679-45B1-95C7-B5CD651E1E0B}" type="datetimeFigureOut">
               <a:rPr lang="en-US" smtClean="0"/>
-              <a:t>7/27/2022</a:t>
+              <a:t>7/28/2022</a:t>
             </a:fld>
             <a:endParaRPr lang="en-US"/>
           </a:p>
@@ -6346,7 +6347,7 @@
           <a:p>
             <a:fld id="{8415B7D3-8679-45B1-95C7-B5CD651E1E0B}" type="datetimeFigureOut">
               <a:rPr lang="en-US" smtClean="0"/>
-              <a:t>7/27/2022</a:t>
+              <a:t>7/28/2022</a:t>
             </a:fld>
             <a:endParaRPr lang="en-US"/>
           </a:p>
@@ -6544,7 +6545,7 @@
           <a:p>
             <a:fld id="{8415B7D3-8679-45B1-95C7-B5CD651E1E0B}" type="datetimeFigureOut">
               <a:rPr lang="en-US" smtClean="0"/>
-              <a:t>7/27/2022</a:t>
+              <a:t>7/28/2022</a:t>
             </a:fld>
             <a:endParaRPr lang="en-US"/>
           </a:p>
@@ -6819,7 +6820,7 @@
           <a:p>
             <a:fld id="{8415B7D3-8679-45B1-95C7-B5CD651E1E0B}" type="datetimeFigureOut">
               <a:rPr lang="en-US" smtClean="0"/>
-              <a:t>7/27/2022</a:t>
+              <a:t>7/28/2022</a:t>
             </a:fld>
             <a:endParaRPr lang="en-US"/>
           </a:p>
@@ -7084,7 +7085,7 @@
           <a:p>
             <a:fld id="{8415B7D3-8679-45B1-95C7-B5CD651E1E0B}" type="datetimeFigureOut">
               <a:rPr lang="en-US" smtClean="0"/>
-              <a:t>7/27/2022</a:t>
+              <a:t>7/28/2022</a:t>
             </a:fld>
             <a:endParaRPr lang="en-US"/>
           </a:p>
@@ -7496,7 +7497,7 @@
           <a:p>
             <a:fld id="{8415B7D3-8679-45B1-95C7-B5CD651E1E0B}" type="datetimeFigureOut">
               <a:rPr lang="en-US" smtClean="0"/>
-              <a:t>7/27/2022</a:t>
+              <a:t>7/28/2022</a:t>
             </a:fld>
             <a:endParaRPr lang="en-US"/>
           </a:p>
@@ -7637,7 +7638,7 @@
           <a:p>
             <a:fld id="{8415B7D3-8679-45B1-95C7-B5CD651E1E0B}" type="datetimeFigureOut">
               <a:rPr lang="en-US" smtClean="0"/>
-              <a:t>7/27/2022</a:t>
+              <a:t>7/28/2022</a:t>
             </a:fld>
             <a:endParaRPr lang="en-US"/>
           </a:p>
@@ -7750,7 +7751,7 @@
           <a:p>
             <a:fld id="{8415B7D3-8679-45B1-95C7-B5CD651E1E0B}" type="datetimeFigureOut">
               <a:rPr lang="en-US" smtClean="0"/>
-              <a:t>7/27/2022</a:t>
+              <a:t>7/28/2022</a:t>
             </a:fld>
             <a:endParaRPr lang="en-US"/>
           </a:p>
@@ -8061,7 +8062,7 @@
           <a:p>
             <a:fld id="{8415B7D3-8679-45B1-95C7-B5CD651E1E0B}" type="datetimeFigureOut">
               <a:rPr lang="en-US" smtClean="0"/>
-              <a:t>7/27/2022</a:t>
+              <a:t>7/28/2022</a:t>
             </a:fld>
             <a:endParaRPr lang="en-US"/>
           </a:p>
@@ -8349,7 +8350,7 @@
           <a:p>
             <a:fld id="{8415B7D3-8679-45B1-95C7-B5CD651E1E0B}" type="datetimeFigureOut">
               <a:rPr lang="en-US" smtClean="0"/>
-              <a:t>7/27/2022</a:t>
+              <a:t>7/28/2022</a:t>
             </a:fld>
             <a:endParaRPr lang="en-US"/>
           </a:p>
@@ -8590,7 +8591,7 @@
           <a:p>
             <a:fld id="{8415B7D3-8679-45B1-95C7-B5CD651E1E0B}" type="datetimeFigureOut">
               <a:rPr lang="en-US" smtClean="0"/>
-              <a:t>7/27/2022</a:t>
+              <a:t>7/28/2022</a:t>
             </a:fld>
             <a:endParaRPr lang="en-US"/>
           </a:p>
@@ -13897,8 +13898,8 @@
           <a:chExt cx="0" cy="0"/>
         </a:xfrm>
       </p:grpSpPr>
-      <mc:AlternateContent xmlns:mc="http://schemas.openxmlformats.org/markup-compatibility/2006">
-        <mc:Choice xmlns:p14="http://schemas.microsoft.com/office/powerpoint/2010/main" Requires="p14">
+      <mc:AlternateContent xmlns:mc="http://schemas.openxmlformats.org/markup-compatibility/2006" xmlns:p14="http://schemas.microsoft.com/office/powerpoint/2010/main">
+        <mc:Choice Requires="p14">
           <p:contentPart p14:bwMode="auto" r:id="rId2">
             <p14:nvContentPartPr>
               <p14:cNvPr id="4" name="Ink 3">
@@ -13917,7 +13918,7 @@
             </p14:xfrm>
           </p:contentPart>
         </mc:Choice>
-        <mc:Fallback>
+        <mc:Fallback xmlns="">
           <p:pic>
             <p:nvPicPr>
               <p:cNvPr id="4" name="Ink 3">
@@ -13948,8 +13949,8 @@
           </p:pic>
         </mc:Fallback>
       </mc:AlternateContent>
-      <mc:AlternateContent xmlns:mc="http://schemas.openxmlformats.org/markup-compatibility/2006">
-        <mc:Choice xmlns:p14="http://schemas.microsoft.com/office/powerpoint/2010/main" Requires="p14">
+      <mc:AlternateContent xmlns:mc="http://schemas.openxmlformats.org/markup-compatibility/2006" xmlns:p14="http://schemas.microsoft.com/office/powerpoint/2010/main">
+        <mc:Choice Requires="p14">
           <p:contentPart p14:bwMode="auto" r:id="rId4">
             <p14:nvContentPartPr>
               <p14:cNvPr id="5" name="Ink 4">
@@ -13968,7 +13969,7 @@
             </p14:xfrm>
           </p:contentPart>
         </mc:Choice>
-        <mc:Fallback>
+        <mc:Fallback xmlns="">
           <p:pic>
             <p:nvPicPr>
               <p:cNvPr id="5" name="Ink 4">
@@ -13999,8 +14000,8 @@
           </p:pic>
         </mc:Fallback>
       </mc:AlternateContent>
-      <mc:AlternateContent xmlns:mc="http://schemas.openxmlformats.org/markup-compatibility/2006">
-        <mc:Choice xmlns:p14="http://schemas.microsoft.com/office/powerpoint/2010/main" Requires="p14">
+      <mc:AlternateContent xmlns:mc="http://schemas.openxmlformats.org/markup-compatibility/2006" xmlns:p14="http://schemas.microsoft.com/office/powerpoint/2010/main">
+        <mc:Choice Requires="p14">
           <p:contentPart p14:bwMode="auto" r:id="rId6">
             <p14:nvContentPartPr>
               <p14:cNvPr id="6" name="Ink 5">
@@ -14019,7 +14020,7 @@
             </p14:xfrm>
           </p:contentPart>
         </mc:Choice>
-        <mc:Fallback>
+        <mc:Fallback xmlns="">
           <p:pic>
             <p:nvPicPr>
               <p:cNvPr id="6" name="Ink 5">
@@ -14050,8 +14051,8 @@
           </p:pic>
         </mc:Fallback>
       </mc:AlternateContent>
-      <mc:AlternateContent xmlns:mc="http://schemas.openxmlformats.org/markup-compatibility/2006">
-        <mc:Choice xmlns:p14="http://schemas.microsoft.com/office/powerpoint/2010/main" Requires="p14">
+      <mc:AlternateContent xmlns:mc="http://schemas.openxmlformats.org/markup-compatibility/2006" xmlns:p14="http://schemas.microsoft.com/office/powerpoint/2010/main">
+        <mc:Choice Requires="p14">
           <p:contentPart p14:bwMode="auto" r:id="rId8">
             <p14:nvContentPartPr>
               <p14:cNvPr id="7" name="Ink 6">
@@ -14070,7 +14071,7 @@
             </p14:xfrm>
           </p:contentPart>
         </mc:Choice>
-        <mc:Fallback>
+        <mc:Fallback xmlns="">
           <p:pic>
             <p:nvPicPr>
               <p:cNvPr id="7" name="Ink 6">
@@ -14101,8 +14102,8 @@
           </p:pic>
         </mc:Fallback>
       </mc:AlternateContent>
-      <mc:AlternateContent xmlns:mc="http://schemas.openxmlformats.org/markup-compatibility/2006">
-        <mc:Choice xmlns:p14="http://schemas.microsoft.com/office/powerpoint/2010/main" Requires="p14">
+      <mc:AlternateContent xmlns:mc="http://schemas.openxmlformats.org/markup-compatibility/2006" xmlns:p14="http://schemas.microsoft.com/office/powerpoint/2010/main">
+        <mc:Choice Requires="p14">
           <p:contentPart p14:bwMode="auto" r:id="rId10">
             <p14:nvContentPartPr>
               <p14:cNvPr id="8" name="Ink 7">
@@ -14121,7 +14122,7 @@
             </p14:xfrm>
           </p:contentPart>
         </mc:Choice>
-        <mc:Fallback>
+        <mc:Fallback xmlns="">
           <p:pic>
             <p:nvPicPr>
               <p:cNvPr id="8" name="Ink 7">
@@ -14152,8 +14153,8 @@
           </p:pic>
         </mc:Fallback>
       </mc:AlternateContent>
-      <mc:AlternateContent xmlns:mc="http://schemas.openxmlformats.org/markup-compatibility/2006">
-        <mc:Choice xmlns:p14="http://schemas.microsoft.com/office/powerpoint/2010/main" Requires="p14">
+      <mc:AlternateContent xmlns:mc="http://schemas.openxmlformats.org/markup-compatibility/2006" xmlns:p14="http://schemas.microsoft.com/office/powerpoint/2010/main">
+        <mc:Choice Requires="p14">
           <p:contentPart p14:bwMode="auto" r:id="rId12">
             <p14:nvContentPartPr>
               <p14:cNvPr id="9" name="Ink 8">
@@ -14172,7 +14173,7 @@
             </p14:xfrm>
           </p:contentPart>
         </mc:Choice>
-        <mc:Fallback>
+        <mc:Fallback xmlns="">
           <p:pic>
             <p:nvPicPr>
               <p:cNvPr id="9" name="Ink 8">
@@ -14203,8 +14204,8 @@
           </p:pic>
         </mc:Fallback>
       </mc:AlternateContent>
-      <mc:AlternateContent xmlns:mc="http://schemas.openxmlformats.org/markup-compatibility/2006">
-        <mc:Choice xmlns:p14="http://schemas.microsoft.com/office/powerpoint/2010/main" Requires="p14">
+      <mc:AlternateContent xmlns:mc="http://schemas.openxmlformats.org/markup-compatibility/2006" xmlns:p14="http://schemas.microsoft.com/office/powerpoint/2010/main">
+        <mc:Choice Requires="p14">
           <p:contentPart p14:bwMode="auto" r:id="rId14">
             <p14:nvContentPartPr>
               <p14:cNvPr id="10" name="Ink 9">
@@ -14223,7 +14224,7 @@
             </p14:xfrm>
           </p:contentPart>
         </mc:Choice>
-        <mc:Fallback>
+        <mc:Fallback xmlns="">
           <p:pic>
             <p:nvPicPr>
               <p:cNvPr id="10" name="Ink 9">
@@ -14254,8 +14255,8 @@
           </p:pic>
         </mc:Fallback>
       </mc:AlternateContent>
-      <mc:AlternateContent xmlns:mc="http://schemas.openxmlformats.org/markup-compatibility/2006">
-        <mc:Choice xmlns:p14="http://schemas.microsoft.com/office/powerpoint/2010/main" Requires="p14">
+      <mc:AlternateContent xmlns:mc="http://schemas.openxmlformats.org/markup-compatibility/2006" xmlns:p14="http://schemas.microsoft.com/office/powerpoint/2010/main">
+        <mc:Choice Requires="p14">
           <p:contentPart p14:bwMode="auto" r:id="rId16">
             <p14:nvContentPartPr>
               <p14:cNvPr id="11" name="Ink 10">
@@ -14274,7 +14275,7 @@
             </p14:xfrm>
           </p:contentPart>
         </mc:Choice>
-        <mc:Fallback>
+        <mc:Fallback xmlns="">
           <p:pic>
             <p:nvPicPr>
               <p:cNvPr id="11" name="Ink 10">
@@ -14305,8 +14306,8 @@
           </p:pic>
         </mc:Fallback>
       </mc:AlternateContent>
-      <mc:AlternateContent xmlns:mc="http://schemas.openxmlformats.org/markup-compatibility/2006">
-        <mc:Choice xmlns:p14="http://schemas.microsoft.com/office/powerpoint/2010/main" Requires="p14">
+      <mc:AlternateContent xmlns:mc="http://schemas.openxmlformats.org/markup-compatibility/2006" xmlns:p14="http://schemas.microsoft.com/office/powerpoint/2010/main">
+        <mc:Choice Requires="p14">
           <p:contentPart p14:bwMode="auto" r:id="rId18">
             <p14:nvContentPartPr>
               <p14:cNvPr id="12" name="Ink 11">
@@ -14325,7 +14326,7 @@
             </p14:xfrm>
           </p:contentPart>
         </mc:Choice>
-        <mc:Fallback>
+        <mc:Fallback xmlns="">
           <p:pic>
             <p:nvPicPr>
               <p:cNvPr id="12" name="Ink 11">
@@ -14356,8 +14357,8 @@
           </p:pic>
         </mc:Fallback>
       </mc:AlternateContent>
-      <mc:AlternateContent xmlns:mc="http://schemas.openxmlformats.org/markup-compatibility/2006">
-        <mc:Choice xmlns:p14="http://schemas.microsoft.com/office/powerpoint/2010/main" Requires="p14">
+      <mc:AlternateContent xmlns:mc="http://schemas.openxmlformats.org/markup-compatibility/2006" xmlns:p14="http://schemas.microsoft.com/office/powerpoint/2010/main">
+        <mc:Choice Requires="p14">
           <p:contentPart p14:bwMode="auto" r:id="rId20">
             <p14:nvContentPartPr>
               <p14:cNvPr id="13" name="Ink 12">
@@ -14376,7 +14377,7 @@
             </p14:xfrm>
           </p:contentPart>
         </mc:Choice>
-        <mc:Fallback>
+        <mc:Fallback xmlns="">
           <p:pic>
             <p:nvPicPr>
               <p:cNvPr id="13" name="Ink 12">
@@ -14407,8 +14408,8 @@
           </p:pic>
         </mc:Fallback>
       </mc:AlternateContent>
-      <mc:AlternateContent xmlns:mc="http://schemas.openxmlformats.org/markup-compatibility/2006">
-        <mc:Choice xmlns:p14="http://schemas.microsoft.com/office/powerpoint/2010/main" Requires="p14">
+      <mc:AlternateContent xmlns:mc="http://schemas.openxmlformats.org/markup-compatibility/2006" xmlns:p14="http://schemas.microsoft.com/office/powerpoint/2010/main">
+        <mc:Choice Requires="p14">
           <p:contentPart p14:bwMode="auto" r:id="rId22">
             <p14:nvContentPartPr>
               <p14:cNvPr id="14" name="Ink 13">
@@ -14427,7 +14428,7 @@
             </p14:xfrm>
           </p:contentPart>
         </mc:Choice>
-        <mc:Fallback>
+        <mc:Fallback xmlns="">
           <p:pic>
             <p:nvPicPr>
               <p:cNvPr id="14" name="Ink 13">
@@ -14458,8 +14459,8 @@
           </p:pic>
         </mc:Fallback>
       </mc:AlternateContent>
-      <mc:AlternateContent xmlns:mc="http://schemas.openxmlformats.org/markup-compatibility/2006">
-        <mc:Choice xmlns:p14="http://schemas.microsoft.com/office/powerpoint/2010/main" Requires="p14">
+      <mc:AlternateContent xmlns:mc="http://schemas.openxmlformats.org/markup-compatibility/2006" xmlns:p14="http://schemas.microsoft.com/office/powerpoint/2010/main">
+        <mc:Choice Requires="p14">
           <p:contentPart p14:bwMode="auto" r:id="rId24">
             <p14:nvContentPartPr>
               <p14:cNvPr id="15" name="Ink 14">
@@ -14478,7 +14479,7 @@
             </p14:xfrm>
           </p:contentPart>
         </mc:Choice>
-        <mc:Fallback>
+        <mc:Fallback xmlns="">
           <p:pic>
             <p:nvPicPr>
               <p:cNvPr id="15" name="Ink 14">
@@ -14509,8 +14510,8 @@
           </p:pic>
         </mc:Fallback>
       </mc:AlternateContent>
-      <mc:AlternateContent xmlns:mc="http://schemas.openxmlformats.org/markup-compatibility/2006">
-        <mc:Choice xmlns:p14="http://schemas.microsoft.com/office/powerpoint/2010/main" Requires="p14">
+      <mc:AlternateContent xmlns:mc="http://schemas.openxmlformats.org/markup-compatibility/2006" xmlns:p14="http://schemas.microsoft.com/office/powerpoint/2010/main">
+        <mc:Choice Requires="p14">
           <p:contentPart p14:bwMode="auto" r:id="rId26">
             <p14:nvContentPartPr>
               <p14:cNvPr id="16" name="Ink 15">
@@ -14529,7 +14530,7 @@
             </p14:xfrm>
           </p:contentPart>
         </mc:Choice>
-        <mc:Fallback>
+        <mc:Fallback xmlns="">
           <p:pic>
             <p:nvPicPr>
               <p:cNvPr id="16" name="Ink 15">
@@ -14560,8 +14561,8 @@
           </p:pic>
         </mc:Fallback>
       </mc:AlternateContent>
-      <mc:AlternateContent xmlns:mc="http://schemas.openxmlformats.org/markup-compatibility/2006">
-        <mc:Choice xmlns:p14="http://schemas.microsoft.com/office/powerpoint/2010/main" Requires="p14">
+      <mc:AlternateContent xmlns:mc="http://schemas.openxmlformats.org/markup-compatibility/2006" xmlns:p14="http://schemas.microsoft.com/office/powerpoint/2010/main">
+        <mc:Choice Requires="p14">
           <p:contentPart p14:bwMode="auto" r:id="rId28">
             <p14:nvContentPartPr>
               <p14:cNvPr id="17" name="Ink 16">
@@ -14580,7 +14581,7 @@
             </p14:xfrm>
           </p:contentPart>
         </mc:Choice>
-        <mc:Fallback>
+        <mc:Fallback xmlns="">
           <p:pic>
             <p:nvPicPr>
               <p:cNvPr id="17" name="Ink 16">
@@ -14611,8 +14612,8 @@
           </p:pic>
         </mc:Fallback>
       </mc:AlternateContent>
-      <mc:AlternateContent xmlns:mc="http://schemas.openxmlformats.org/markup-compatibility/2006">
-        <mc:Choice xmlns:p14="http://schemas.microsoft.com/office/powerpoint/2010/main" Requires="p14">
+      <mc:AlternateContent xmlns:mc="http://schemas.openxmlformats.org/markup-compatibility/2006" xmlns:p14="http://schemas.microsoft.com/office/powerpoint/2010/main">
+        <mc:Choice Requires="p14">
           <p:contentPart p14:bwMode="auto" r:id="rId30">
             <p14:nvContentPartPr>
               <p14:cNvPr id="18" name="Ink 17">
@@ -14631,7 +14632,7 @@
             </p14:xfrm>
           </p:contentPart>
         </mc:Choice>
-        <mc:Fallback>
+        <mc:Fallback xmlns="">
           <p:pic>
             <p:nvPicPr>
               <p:cNvPr id="18" name="Ink 17">
@@ -14662,8 +14663,8 @@
           </p:pic>
         </mc:Fallback>
       </mc:AlternateContent>
-      <mc:AlternateContent xmlns:mc="http://schemas.openxmlformats.org/markup-compatibility/2006">
-        <mc:Choice xmlns:p14="http://schemas.microsoft.com/office/powerpoint/2010/main" Requires="p14">
+      <mc:AlternateContent xmlns:mc="http://schemas.openxmlformats.org/markup-compatibility/2006" xmlns:p14="http://schemas.microsoft.com/office/powerpoint/2010/main">
+        <mc:Choice Requires="p14">
           <p:contentPart p14:bwMode="auto" r:id="rId32">
             <p14:nvContentPartPr>
               <p14:cNvPr id="19" name="Ink 18">
@@ -14682,7 +14683,7 @@
             </p14:xfrm>
           </p:contentPart>
         </mc:Choice>
-        <mc:Fallback>
+        <mc:Fallback xmlns="">
           <p:pic>
             <p:nvPicPr>
               <p:cNvPr id="19" name="Ink 18">
@@ -14713,8 +14714,8 @@
           </p:pic>
         </mc:Fallback>
       </mc:AlternateContent>
-      <mc:AlternateContent xmlns:mc="http://schemas.openxmlformats.org/markup-compatibility/2006">
-        <mc:Choice xmlns:p14="http://schemas.microsoft.com/office/powerpoint/2010/main" Requires="p14">
+      <mc:AlternateContent xmlns:mc="http://schemas.openxmlformats.org/markup-compatibility/2006" xmlns:p14="http://schemas.microsoft.com/office/powerpoint/2010/main">
+        <mc:Choice Requires="p14">
           <p:contentPart p14:bwMode="auto" r:id="rId34">
             <p14:nvContentPartPr>
               <p14:cNvPr id="20" name="Ink 19">
@@ -14733,7 +14734,7 @@
             </p14:xfrm>
           </p:contentPart>
         </mc:Choice>
-        <mc:Fallback>
+        <mc:Fallback xmlns="">
           <p:pic>
             <p:nvPicPr>
               <p:cNvPr id="20" name="Ink 19">
@@ -14764,8 +14765,8 @@
           </p:pic>
         </mc:Fallback>
       </mc:AlternateContent>
-      <mc:AlternateContent xmlns:mc="http://schemas.openxmlformats.org/markup-compatibility/2006">
-        <mc:Choice xmlns:p14="http://schemas.microsoft.com/office/powerpoint/2010/main" Requires="p14">
+      <mc:AlternateContent xmlns:mc="http://schemas.openxmlformats.org/markup-compatibility/2006" xmlns:p14="http://schemas.microsoft.com/office/powerpoint/2010/main">
+        <mc:Choice Requires="p14">
           <p:contentPart p14:bwMode="auto" r:id="rId36">
             <p14:nvContentPartPr>
               <p14:cNvPr id="21" name="Ink 20">
@@ -14784,7 +14785,7 @@
             </p14:xfrm>
           </p:contentPart>
         </mc:Choice>
-        <mc:Fallback>
+        <mc:Fallback xmlns="">
           <p:pic>
             <p:nvPicPr>
               <p:cNvPr id="21" name="Ink 20">
@@ -14815,8 +14816,8 @@
           </p:pic>
         </mc:Fallback>
       </mc:AlternateContent>
-      <mc:AlternateContent xmlns:mc="http://schemas.openxmlformats.org/markup-compatibility/2006">
-        <mc:Choice xmlns:p14="http://schemas.microsoft.com/office/powerpoint/2010/main" Requires="p14">
+      <mc:AlternateContent xmlns:mc="http://schemas.openxmlformats.org/markup-compatibility/2006" xmlns:p14="http://schemas.microsoft.com/office/powerpoint/2010/main">
+        <mc:Choice Requires="p14">
           <p:contentPart p14:bwMode="auto" r:id="rId38">
             <p14:nvContentPartPr>
               <p14:cNvPr id="22" name="Ink 21">
@@ -14835,7 +14836,7 @@
             </p14:xfrm>
           </p:contentPart>
         </mc:Choice>
-        <mc:Fallback>
+        <mc:Fallback xmlns="">
           <p:pic>
             <p:nvPicPr>
               <p:cNvPr id="22" name="Ink 21">
@@ -14866,8 +14867,8 @@
           </p:pic>
         </mc:Fallback>
       </mc:AlternateContent>
-      <mc:AlternateContent xmlns:mc="http://schemas.openxmlformats.org/markup-compatibility/2006">
-        <mc:Choice xmlns:p14="http://schemas.microsoft.com/office/powerpoint/2010/main" Requires="p14">
+      <mc:AlternateContent xmlns:mc="http://schemas.openxmlformats.org/markup-compatibility/2006" xmlns:p14="http://schemas.microsoft.com/office/powerpoint/2010/main">
+        <mc:Choice Requires="p14">
           <p:contentPart p14:bwMode="auto" r:id="rId40">
             <p14:nvContentPartPr>
               <p14:cNvPr id="23" name="Ink 22">
@@ -14886,7 +14887,7 @@
             </p14:xfrm>
           </p:contentPart>
         </mc:Choice>
-        <mc:Fallback>
+        <mc:Fallback xmlns="">
           <p:pic>
             <p:nvPicPr>
               <p:cNvPr id="23" name="Ink 22">
@@ -14917,8 +14918,8 @@
           </p:pic>
         </mc:Fallback>
       </mc:AlternateContent>
-      <mc:AlternateContent xmlns:mc="http://schemas.openxmlformats.org/markup-compatibility/2006">
-        <mc:Choice xmlns:p14="http://schemas.microsoft.com/office/powerpoint/2010/main" Requires="p14">
+      <mc:AlternateContent xmlns:mc="http://schemas.openxmlformats.org/markup-compatibility/2006" xmlns:p14="http://schemas.microsoft.com/office/powerpoint/2010/main">
+        <mc:Choice Requires="p14">
           <p:contentPart p14:bwMode="auto" r:id="rId42">
             <p14:nvContentPartPr>
               <p14:cNvPr id="24" name="Ink 23">
@@ -14937,7 +14938,7 @@
             </p14:xfrm>
           </p:contentPart>
         </mc:Choice>
-        <mc:Fallback>
+        <mc:Fallback xmlns="">
           <p:pic>
             <p:nvPicPr>
               <p:cNvPr id="24" name="Ink 23">
@@ -14968,8 +14969,8 @@
           </p:pic>
         </mc:Fallback>
       </mc:AlternateContent>
-      <mc:AlternateContent xmlns:mc="http://schemas.openxmlformats.org/markup-compatibility/2006">
-        <mc:Choice xmlns:p14="http://schemas.microsoft.com/office/powerpoint/2010/main" Requires="p14">
+      <mc:AlternateContent xmlns:mc="http://schemas.openxmlformats.org/markup-compatibility/2006" xmlns:p14="http://schemas.microsoft.com/office/powerpoint/2010/main">
+        <mc:Choice Requires="p14">
           <p:contentPart p14:bwMode="auto" r:id="rId44">
             <p14:nvContentPartPr>
               <p14:cNvPr id="25" name="Ink 24">
@@ -14988,7 +14989,7 @@
             </p14:xfrm>
           </p:contentPart>
         </mc:Choice>
-        <mc:Fallback>
+        <mc:Fallback xmlns="">
           <p:pic>
             <p:nvPicPr>
               <p:cNvPr id="25" name="Ink 24">
@@ -15019,8 +15020,8 @@
           </p:pic>
         </mc:Fallback>
       </mc:AlternateContent>
-      <mc:AlternateContent xmlns:mc="http://schemas.openxmlformats.org/markup-compatibility/2006">
-        <mc:Choice xmlns:p14="http://schemas.microsoft.com/office/powerpoint/2010/main" Requires="p14">
+      <mc:AlternateContent xmlns:mc="http://schemas.openxmlformats.org/markup-compatibility/2006" xmlns:p14="http://schemas.microsoft.com/office/powerpoint/2010/main">
+        <mc:Choice Requires="p14">
           <p:contentPart p14:bwMode="auto" r:id="rId46">
             <p14:nvContentPartPr>
               <p14:cNvPr id="26" name="Ink 25">
@@ -15039,7 +15040,7 @@
             </p14:xfrm>
           </p:contentPart>
         </mc:Choice>
-        <mc:Fallback>
+        <mc:Fallback xmlns="">
           <p:pic>
             <p:nvPicPr>
               <p:cNvPr id="26" name="Ink 25">
@@ -15070,8 +15071,8 @@
           </p:pic>
         </mc:Fallback>
       </mc:AlternateContent>
-      <mc:AlternateContent xmlns:mc="http://schemas.openxmlformats.org/markup-compatibility/2006">
-        <mc:Choice xmlns:p14="http://schemas.microsoft.com/office/powerpoint/2010/main" Requires="p14">
+      <mc:AlternateContent xmlns:mc="http://schemas.openxmlformats.org/markup-compatibility/2006" xmlns:p14="http://schemas.microsoft.com/office/powerpoint/2010/main">
+        <mc:Choice Requires="p14">
           <p:contentPart p14:bwMode="auto" r:id="rId48">
             <p14:nvContentPartPr>
               <p14:cNvPr id="27" name="Ink 26">
@@ -15090,7 +15091,7 @@
             </p14:xfrm>
           </p:contentPart>
         </mc:Choice>
-        <mc:Fallback>
+        <mc:Fallback xmlns="">
           <p:pic>
             <p:nvPicPr>
               <p:cNvPr id="27" name="Ink 26">
@@ -15121,8 +15122,8 @@
           </p:pic>
         </mc:Fallback>
       </mc:AlternateContent>
-      <mc:AlternateContent xmlns:mc="http://schemas.openxmlformats.org/markup-compatibility/2006">
-        <mc:Choice xmlns:p14="http://schemas.microsoft.com/office/powerpoint/2010/main" Requires="p14">
+      <mc:AlternateContent xmlns:mc="http://schemas.openxmlformats.org/markup-compatibility/2006" xmlns:p14="http://schemas.microsoft.com/office/powerpoint/2010/main">
+        <mc:Choice Requires="p14">
           <p:contentPart p14:bwMode="auto" r:id="rId50">
             <p14:nvContentPartPr>
               <p14:cNvPr id="28" name="Ink 27">
@@ -15141,7 +15142,7 @@
             </p14:xfrm>
           </p:contentPart>
         </mc:Choice>
-        <mc:Fallback>
+        <mc:Fallback xmlns="">
           <p:pic>
             <p:nvPicPr>
               <p:cNvPr id="28" name="Ink 27">
@@ -15172,8 +15173,8 @@
           </p:pic>
         </mc:Fallback>
       </mc:AlternateContent>
-      <mc:AlternateContent xmlns:mc="http://schemas.openxmlformats.org/markup-compatibility/2006">
-        <mc:Choice xmlns:p14="http://schemas.microsoft.com/office/powerpoint/2010/main" Requires="p14">
+      <mc:AlternateContent xmlns:mc="http://schemas.openxmlformats.org/markup-compatibility/2006" xmlns:p14="http://schemas.microsoft.com/office/powerpoint/2010/main">
+        <mc:Choice Requires="p14">
           <p:contentPart p14:bwMode="auto" r:id="rId52">
             <p14:nvContentPartPr>
               <p14:cNvPr id="29" name="Ink 28">
@@ -15192,7 +15193,7 @@
             </p14:xfrm>
           </p:contentPart>
         </mc:Choice>
-        <mc:Fallback>
+        <mc:Fallback xmlns="">
           <p:pic>
             <p:nvPicPr>
               <p:cNvPr id="29" name="Ink 28">
@@ -15223,8 +15224,8 @@
           </p:pic>
         </mc:Fallback>
       </mc:AlternateContent>
-      <mc:AlternateContent xmlns:mc="http://schemas.openxmlformats.org/markup-compatibility/2006">
-        <mc:Choice xmlns:p14="http://schemas.microsoft.com/office/powerpoint/2010/main" Requires="p14">
+      <mc:AlternateContent xmlns:mc="http://schemas.openxmlformats.org/markup-compatibility/2006" xmlns:p14="http://schemas.microsoft.com/office/powerpoint/2010/main">
+        <mc:Choice Requires="p14">
           <p:contentPart p14:bwMode="auto" r:id="rId54">
             <p14:nvContentPartPr>
               <p14:cNvPr id="30" name="Ink 29">
@@ -15243,7 +15244,7 @@
             </p14:xfrm>
           </p:contentPart>
         </mc:Choice>
-        <mc:Fallback>
+        <mc:Fallback xmlns="">
           <p:pic>
             <p:nvPicPr>
               <p:cNvPr id="30" name="Ink 29">
@@ -15274,8 +15275,8 @@
           </p:pic>
         </mc:Fallback>
       </mc:AlternateContent>
-      <mc:AlternateContent xmlns:mc="http://schemas.openxmlformats.org/markup-compatibility/2006">
-        <mc:Choice xmlns:p14="http://schemas.microsoft.com/office/powerpoint/2010/main" Requires="p14">
+      <mc:AlternateContent xmlns:mc="http://schemas.openxmlformats.org/markup-compatibility/2006" xmlns:p14="http://schemas.microsoft.com/office/powerpoint/2010/main">
+        <mc:Choice Requires="p14">
           <p:contentPart p14:bwMode="auto" r:id="rId56">
             <p14:nvContentPartPr>
               <p14:cNvPr id="31" name="Ink 30">
@@ -15294,7 +15295,7 @@
             </p14:xfrm>
           </p:contentPart>
         </mc:Choice>
-        <mc:Fallback>
+        <mc:Fallback xmlns="">
           <p:pic>
             <p:nvPicPr>
               <p:cNvPr id="31" name="Ink 30">
@@ -15325,8 +15326,8 @@
           </p:pic>
         </mc:Fallback>
       </mc:AlternateContent>
-      <mc:AlternateContent xmlns:mc="http://schemas.openxmlformats.org/markup-compatibility/2006">
-        <mc:Choice xmlns:p14="http://schemas.microsoft.com/office/powerpoint/2010/main" Requires="p14">
+      <mc:AlternateContent xmlns:mc="http://schemas.openxmlformats.org/markup-compatibility/2006" xmlns:p14="http://schemas.microsoft.com/office/powerpoint/2010/main">
+        <mc:Choice Requires="p14">
           <p:contentPart p14:bwMode="auto" r:id="rId58">
             <p14:nvContentPartPr>
               <p14:cNvPr id="32" name="Ink 31">
@@ -15345,7 +15346,7 @@
             </p14:xfrm>
           </p:contentPart>
         </mc:Choice>
-        <mc:Fallback>
+        <mc:Fallback xmlns="">
           <p:pic>
             <p:nvPicPr>
               <p:cNvPr id="32" name="Ink 31">
@@ -15376,8 +15377,8 @@
           </p:pic>
         </mc:Fallback>
       </mc:AlternateContent>
-      <mc:AlternateContent xmlns:mc="http://schemas.openxmlformats.org/markup-compatibility/2006">
-        <mc:Choice xmlns:p14="http://schemas.microsoft.com/office/powerpoint/2010/main" Requires="p14">
+      <mc:AlternateContent xmlns:mc="http://schemas.openxmlformats.org/markup-compatibility/2006" xmlns:p14="http://schemas.microsoft.com/office/powerpoint/2010/main">
+        <mc:Choice Requires="p14">
           <p:contentPart p14:bwMode="auto" r:id="rId60">
             <p14:nvContentPartPr>
               <p14:cNvPr id="33" name="Ink 32">
@@ -15396,7 +15397,7 @@
             </p14:xfrm>
           </p:contentPart>
         </mc:Choice>
-        <mc:Fallback>
+        <mc:Fallback xmlns="">
           <p:pic>
             <p:nvPicPr>
               <p:cNvPr id="33" name="Ink 32">
@@ -15427,8 +15428,8 @@
           </p:pic>
         </mc:Fallback>
       </mc:AlternateContent>
-      <mc:AlternateContent xmlns:mc="http://schemas.openxmlformats.org/markup-compatibility/2006">
-        <mc:Choice xmlns:p14="http://schemas.microsoft.com/office/powerpoint/2010/main" Requires="p14">
+      <mc:AlternateContent xmlns:mc="http://schemas.openxmlformats.org/markup-compatibility/2006" xmlns:p14="http://schemas.microsoft.com/office/powerpoint/2010/main">
+        <mc:Choice Requires="p14">
           <p:contentPart p14:bwMode="auto" r:id="rId62">
             <p14:nvContentPartPr>
               <p14:cNvPr id="34" name="Ink 33">
@@ -15447,7 +15448,7 @@
             </p14:xfrm>
           </p:contentPart>
         </mc:Choice>
-        <mc:Fallback>
+        <mc:Fallback xmlns="">
           <p:pic>
             <p:nvPicPr>
               <p:cNvPr id="34" name="Ink 33">
@@ -15478,8 +15479,8 @@
           </p:pic>
         </mc:Fallback>
       </mc:AlternateContent>
-      <mc:AlternateContent xmlns:mc="http://schemas.openxmlformats.org/markup-compatibility/2006">
-        <mc:Choice xmlns:p14="http://schemas.microsoft.com/office/powerpoint/2010/main" Requires="p14">
+      <mc:AlternateContent xmlns:mc="http://schemas.openxmlformats.org/markup-compatibility/2006" xmlns:p14="http://schemas.microsoft.com/office/powerpoint/2010/main">
+        <mc:Choice Requires="p14">
           <p:contentPart p14:bwMode="auto" r:id="rId64">
             <p14:nvContentPartPr>
               <p14:cNvPr id="35" name="Ink 34">
@@ -15498,7 +15499,7 @@
             </p14:xfrm>
           </p:contentPart>
         </mc:Choice>
-        <mc:Fallback>
+        <mc:Fallback xmlns="">
           <p:pic>
             <p:nvPicPr>
               <p:cNvPr id="35" name="Ink 34">
@@ -15529,8 +15530,8 @@
           </p:pic>
         </mc:Fallback>
       </mc:AlternateContent>
-      <mc:AlternateContent xmlns:mc="http://schemas.openxmlformats.org/markup-compatibility/2006">
-        <mc:Choice xmlns:p14="http://schemas.microsoft.com/office/powerpoint/2010/main" Requires="p14">
+      <mc:AlternateContent xmlns:mc="http://schemas.openxmlformats.org/markup-compatibility/2006" xmlns:p14="http://schemas.microsoft.com/office/powerpoint/2010/main">
+        <mc:Choice Requires="p14">
           <p:contentPart p14:bwMode="auto" r:id="rId66">
             <p14:nvContentPartPr>
               <p14:cNvPr id="36" name="Ink 35">
@@ -15549,7 +15550,7 @@
             </p14:xfrm>
           </p:contentPart>
         </mc:Choice>
-        <mc:Fallback>
+        <mc:Fallback xmlns="">
           <p:pic>
             <p:nvPicPr>
               <p:cNvPr id="36" name="Ink 35">
@@ -15580,8 +15581,8 @@
           </p:pic>
         </mc:Fallback>
       </mc:AlternateContent>
-      <mc:AlternateContent xmlns:mc="http://schemas.openxmlformats.org/markup-compatibility/2006">
-        <mc:Choice xmlns:p14="http://schemas.microsoft.com/office/powerpoint/2010/main" Requires="p14">
+      <mc:AlternateContent xmlns:mc="http://schemas.openxmlformats.org/markup-compatibility/2006" xmlns:p14="http://schemas.microsoft.com/office/powerpoint/2010/main">
+        <mc:Choice Requires="p14">
           <p:contentPart p14:bwMode="auto" r:id="rId68">
             <p14:nvContentPartPr>
               <p14:cNvPr id="37" name="Ink 36">
@@ -15600,7 +15601,7 @@
             </p14:xfrm>
           </p:contentPart>
         </mc:Choice>
-        <mc:Fallback>
+        <mc:Fallback xmlns="">
           <p:pic>
             <p:nvPicPr>
               <p:cNvPr id="37" name="Ink 36">
@@ -15631,8 +15632,8 @@
           </p:pic>
         </mc:Fallback>
       </mc:AlternateContent>
-      <mc:AlternateContent xmlns:mc="http://schemas.openxmlformats.org/markup-compatibility/2006">
-        <mc:Choice xmlns:p14="http://schemas.microsoft.com/office/powerpoint/2010/main" Requires="p14">
+      <mc:AlternateContent xmlns:mc="http://schemas.openxmlformats.org/markup-compatibility/2006" xmlns:p14="http://schemas.microsoft.com/office/powerpoint/2010/main">
+        <mc:Choice Requires="p14">
           <p:contentPart p14:bwMode="auto" r:id="rId70">
             <p14:nvContentPartPr>
               <p14:cNvPr id="38" name="Ink 37">
@@ -15651,7 +15652,7 @@
             </p14:xfrm>
           </p:contentPart>
         </mc:Choice>
-        <mc:Fallback>
+        <mc:Fallback xmlns="">
           <p:pic>
             <p:nvPicPr>
               <p:cNvPr id="38" name="Ink 37">
@@ -15682,8 +15683,8 @@
           </p:pic>
         </mc:Fallback>
       </mc:AlternateContent>
-      <mc:AlternateContent xmlns:mc="http://schemas.openxmlformats.org/markup-compatibility/2006">
-        <mc:Choice xmlns:p14="http://schemas.microsoft.com/office/powerpoint/2010/main" Requires="p14">
+      <mc:AlternateContent xmlns:mc="http://schemas.openxmlformats.org/markup-compatibility/2006" xmlns:p14="http://schemas.microsoft.com/office/powerpoint/2010/main">
+        <mc:Choice Requires="p14">
           <p:contentPart p14:bwMode="auto" r:id="rId72">
             <p14:nvContentPartPr>
               <p14:cNvPr id="39" name="Ink 38">
@@ -15702,7 +15703,7 @@
             </p14:xfrm>
           </p:contentPart>
         </mc:Choice>
-        <mc:Fallback>
+        <mc:Fallback xmlns="">
           <p:pic>
             <p:nvPicPr>
               <p:cNvPr id="39" name="Ink 38">
@@ -15733,8 +15734,8 @@
           </p:pic>
         </mc:Fallback>
       </mc:AlternateContent>
-      <mc:AlternateContent xmlns:mc="http://schemas.openxmlformats.org/markup-compatibility/2006">
-        <mc:Choice xmlns:p14="http://schemas.microsoft.com/office/powerpoint/2010/main" Requires="p14">
+      <mc:AlternateContent xmlns:mc="http://schemas.openxmlformats.org/markup-compatibility/2006" xmlns:p14="http://schemas.microsoft.com/office/powerpoint/2010/main">
+        <mc:Choice Requires="p14">
           <p:contentPart p14:bwMode="auto" r:id="rId74">
             <p14:nvContentPartPr>
               <p14:cNvPr id="40" name="Ink 39">
@@ -15753,7 +15754,7 @@
             </p14:xfrm>
           </p:contentPart>
         </mc:Choice>
-        <mc:Fallback>
+        <mc:Fallback xmlns="">
           <p:pic>
             <p:nvPicPr>
               <p:cNvPr id="40" name="Ink 39">
@@ -15784,8 +15785,8 @@
           </p:pic>
         </mc:Fallback>
       </mc:AlternateContent>
-      <mc:AlternateContent xmlns:mc="http://schemas.openxmlformats.org/markup-compatibility/2006">
-        <mc:Choice xmlns:p14="http://schemas.microsoft.com/office/powerpoint/2010/main" Requires="p14">
+      <mc:AlternateContent xmlns:mc="http://schemas.openxmlformats.org/markup-compatibility/2006" xmlns:p14="http://schemas.microsoft.com/office/powerpoint/2010/main">
+        <mc:Choice Requires="p14">
           <p:contentPart p14:bwMode="auto" r:id="rId76">
             <p14:nvContentPartPr>
               <p14:cNvPr id="41" name="Ink 40">
@@ -15804,7 +15805,7 @@
             </p14:xfrm>
           </p:contentPart>
         </mc:Choice>
-        <mc:Fallback>
+        <mc:Fallback xmlns="">
           <p:pic>
             <p:nvPicPr>
               <p:cNvPr id="41" name="Ink 40">
@@ -15835,8 +15836,8 @@
           </p:pic>
         </mc:Fallback>
       </mc:AlternateContent>
-      <mc:AlternateContent xmlns:mc="http://schemas.openxmlformats.org/markup-compatibility/2006">
-        <mc:Choice xmlns:p14="http://schemas.microsoft.com/office/powerpoint/2010/main" Requires="p14">
+      <mc:AlternateContent xmlns:mc="http://schemas.openxmlformats.org/markup-compatibility/2006" xmlns:p14="http://schemas.microsoft.com/office/powerpoint/2010/main">
+        <mc:Choice Requires="p14">
           <p:contentPart p14:bwMode="auto" r:id="rId78">
             <p14:nvContentPartPr>
               <p14:cNvPr id="42" name="Ink 41">
@@ -15855,7 +15856,7 @@
             </p14:xfrm>
           </p:contentPart>
         </mc:Choice>
-        <mc:Fallback>
+        <mc:Fallback xmlns="">
           <p:pic>
             <p:nvPicPr>
               <p:cNvPr id="42" name="Ink 41">
@@ -15886,8 +15887,8 @@
           </p:pic>
         </mc:Fallback>
       </mc:AlternateContent>
-      <mc:AlternateContent xmlns:mc="http://schemas.openxmlformats.org/markup-compatibility/2006">
-        <mc:Choice xmlns:p14="http://schemas.microsoft.com/office/powerpoint/2010/main" Requires="p14">
+      <mc:AlternateContent xmlns:mc="http://schemas.openxmlformats.org/markup-compatibility/2006" xmlns:p14="http://schemas.microsoft.com/office/powerpoint/2010/main">
+        <mc:Choice Requires="p14">
           <p:contentPart p14:bwMode="auto" r:id="rId80">
             <p14:nvContentPartPr>
               <p14:cNvPr id="43" name="Ink 42">
@@ -15906,7 +15907,7 @@
             </p14:xfrm>
           </p:contentPart>
         </mc:Choice>
-        <mc:Fallback>
+        <mc:Fallback xmlns="">
           <p:pic>
             <p:nvPicPr>
               <p:cNvPr id="43" name="Ink 42">
@@ -15937,8 +15938,8 @@
           </p:pic>
         </mc:Fallback>
       </mc:AlternateContent>
-      <mc:AlternateContent xmlns:mc="http://schemas.openxmlformats.org/markup-compatibility/2006">
-        <mc:Choice xmlns:p14="http://schemas.microsoft.com/office/powerpoint/2010/main" Requires="p14">
+      <mc:AlternateContent xmlns:mc="http://schemas.openxmlformats.org/markup-compatibility/2006" xmlns:p14="http://schemas.microsoft.com/office/powerpoint/2010/main">
+        <mc:Choice Requires="p14">
           <p:contentPart p14:bwMode="auto" r:id="rId82">
             <p14:nvContentPartPr>
               <p14:cNvPr id="44" name="Ink 43">
@@ -15957,7 +15958,7 @@
             </p14:xfrm>
           </p:contentPart>
         </mc:Choice>
-        <mc:Fallback>
+        <mc:Fallback xmlns="">
           <p:pic>
             <p:nvPicPr>
               <p:cNvPr id="44" name="Ink 43">
@@ -15988,8 +15989,8 @@
           </p:pic>
         </mc:Fallback>
       </mc:AlternateContent>
-      <mc:AlternateContent xmlns:mc="http://schemas.openxmlformats.org/markup-compatibility/2006">
-        <mc:Choice xmlns:p14="http://schemas.microsoft.com/office/powerpoint/2010/main" Requires="p14">
+      <mc:AlternateContent xmlns:mc="http://schemas.openxmlformats.org/markup-compatibility/2006" xmlns:p14="http://schemas.microsoft.com/office/powerpoint/2010/main">
+        <mc:Choice Requires="p14">
           <p:contentPart p14:bwMode="auto" r:id="rId84">
             <p14:nvContentPartPr>
               <p14:cNvPr id="45" name="Ink 44">
@@ -16008,7 +16009,7 @@
             </p14:xfrm>
           </p:contentPart>
         </mc:Choice>
-        <mc:Fallback>
+        <mc:Fallback xmlns="">
           <p:pic>
             <p:nvPicPr>
               <p:cNvPr id="45" name="Ink 44">
@@ -16039,8 +16040,8 @@
           </p:pic>
         </mc:Fallback>
       </mc:AlternateContent>
-      <mc:AlternateContent xmlns:mc="http://schemas.openxmlformats.org/markup-compatibility/2006">
-        <mc:Choice xmlns:p14="http://schemas.microsoft.com/office/powerpoint/2010/main" Requires="p14">
+      <mc:AlternateContent xmlns:mc="http://schemas.openxmlformats.org/markup-compatibility/2006" xmlns:p14="http://schemas.microsoft.com/office/powerpoint/2010/main">
+        <mc:Choice Requires="p14">
           <p:contentPart p14:bwMode="auto" r:id="rId86">
             <p14:nvContentPartPr>
               <p14:cNvPr id="46" name="Ink 45">
@@ -16059,7 +16060,7 @@
             </p14:xfrm>
           </p:contentPart>
         </mc:Choice>
-        <mc:Fallback>
+        <mc:Fallback xmlns="">
           <p:pic>
             <p:nvPicPr>
               <p:cNvPr id="46" name="Ink 45">
@@ -16090,8 +16091,8 @@
           </p:pic>
         </mc:Fallback>
       </mc:AlternateContent>
-      <mc:AlternateContent xmlns:mc="http://schemas.openxmlformats.org/markup-compatibility/2006">
-        <mc:Choice xmlns:p14="http://schemas.microsoft.com/office/powerpoint/2010/main" Requires="p14">
+      <mc:AlternateContent xmlns:mc="http://schemas.openxmlformats.org/markup-compatibility/2006" xmlns:p14="http://schemas.microsoft.com/office/powerpoint/2010/main">
+        <mc:Choice Requires="p14">
           <p:contentPart p14:bwMode="auto" r:id="rId88">
             <p14:nvContentPartPr>
               <p14:cNvPr id="47" name="Ink 46">
@@ -16110,7 +16111,7 @@
             </p14:xfrm>
           </p:contentPart>
         </mc:Choice>
-        <mc:Fallback>
+        <mc:Fallback xmlns="">
           <p:pic>
             <p:nvPicPr>
               <p:cNvPr id="47" name="Ink 46">
@@ -16141,8 +16142,8 @@
           </p:pic>
         </mc:Fallback>
       </mc:AlternateContent>
-      <mc:AlternateContent xmlns:mc="http://schemas.openxmlformats.org/markup-compatibility/2006">
-        <mc:Choice xmlns:p14="http://schemas.microsoft.com/office/powerpoint/2010/main" Requires="p14">
+      <mc:AlternateContent xmlns:mc="http://schemas.openxmlformats.org/markup-compatibility/2006" xmlns:p14="http://schemas.microsoft.com/office/powerpoint/2010/main">
+        <mc:Choice Requires="p14">
           <p:contentPart p14:bwMode="auto" r:id="rId90">
             <p14:nvContentPartPr>
               <p14:cNvPr id="48" name="Ink 47">
@@ -16161,7 +16162,7 @@
             </p14:xfrm>
           </p:contentPart>
         </mc:Choice>
-        <mc:Fallback>
+        <mc:Fallback xmlns="">
           <p:pic>
             <p:nvPicPr>
               <p:cNvPr id="48" name="Ink 47">
@@ -16192,8 +16193,8 @@
           </p:pic>
         </mc:Fallback>
       </mc:AlternateContent>
-      <mc:AlternateContent xmlns:mc="http://schemas.openxmlformats.org/markup-compatibility/2006">
-        <mc:Choice xmlns:p14="http://schemas.microsoft.com/office/powerpoint/2010/main" Requires="p14">
+      <mc:AlternateContent xmlns:mc="http://schemas.openxmlformats.org/markup-compatibility/2006" xmlns:p14="http://schemas.microsoft.com/office/powerpoint/2010/main">
+        <mc:Choice Requires="p14">
           <p:contentPart p14:bwMode="auto" r:id="rId92">
             <p14:nvContentPartPr>
               <p14:cNvPr id="49" name="Ink 48">
@@ -16212,7 +16213,7 @@
             </p14:xfrm>
           </p:contentPart>
         </mc:Choice>
-        <mc:Fallback>
+        <mc:Fallback xmlns="">
           <p:pic>
             <p:nvPicPr>
               <p:cNvPr id="49" name="Ink 48">
@@ -16243,8 +16244,8 @@
           </p:pic>
         </mc:Fallback>
       </mc:AlternateContent>
-      <mc:AlternateContent xmlns:mc="http://schemas.openxmlformats.org/markup-compatibility/2006">
-        <mc:Choice xmlns:p14="http://schemas.microsoft.com/office/powerpoint/2010/main" Requires="p14">
+      <mc:AlternateContent xmlns:mc="http://schemas.openxmlformats.org/markup-compatibility/2006" xmlns:p14="http://schemas.microsoft.com/office/powerpoint/2010/main">
+        <mc:Choice Requires="p14">
           <p:contentPart p14:bwMode="auto" r:id="rId94">
             <p14:nvContentPartPr>
               <p14:cNvPr id="50" name="Ink 49">
@@ -16263,7 +16264,7 @@
             </p14:xfrm>
           </p:contentPart>
         </mc:Choice>
-        <mc:Fallback>
+        <mc:Fallback xmlns="">
           <p:pic>
             <p:nvPicPr>
               <p:cNvPr id="50" name="Ink 49">
@@ -16294,8 +16295,8 @@
           </p:pic>
         </mc:Fallback>
       </mc:AlternateContent>
-      <mc:AlternateContent xmlns:mc="http://schemas.openxmlformats.org/markup-compatibility/2006">
-        <mc:Choice xmlns:p14="http://schemas.microsoft.com/office/powerpoint/2010/main" Requires="p14">
+      <mc:AlternateContent xmlns:mc="http://schemas.openxmlformats.org/markup-compatibility/2006" xmlns:p14="http://schemas.microsoft.com/office/powerpoint/2010/main">
+        <mc:Choice Requires="p14">
           <p:contentPart p14:bwMode="auto" r:id="rId96">
             <p14:nvContentPartPr>
               <p14:cNvPr id="51" name="Ink 50">
@@ -16314,7 +16315,7 @@
             </p14:xfrm>
           </p:contentPart>
         </mc:Choice>
-        <mc:Fallback>
+        <mc:Fallback xmlns="">
           <p:pic>
             <p:nvPicPr>
               <p:cNvPr id="51" name="Ink 50">
@@ -16365,8 +16366,8 @@
             <a:chExt cx="333720" cy="433440"/>
           </a:xfrm>
         </p:grpSpPr>
-        <mc:AlternateContent xmlns:mc="http://schemas.openxmlformats.org/markup-compatibility/2006">
-          <mc:Choice xmlns:p14="http://schemas.microsoft.com/office/powerpoint/2010/main" xmlns:aink="http://schemas.microsoft.com/office/drawing/2016/ink" Requires="p14 aink">
+        <mc:AlternateContent xmlns:mc="http://schemas.openxmlformats.org/markup-compatibility/2006" xmlns:p14="http://schemas.microsoft.com/office/powerpoint/2010/main" xmlns:aink="http://schemas.microsoft.com/office/drawing/2016/ink">
+          <mc:Choice Requires="p14 aink">
             <p:contentPart p14:bwMode="auto" r:id="rId98">
               <p14:nvContentPartPr>
                 <p14:cNvPr id="52" name="Ink 51">
@@ -16385,7 +16386,7 @@
               </p14:xfrm>
             </p:contentPart>
           </mc:Choice>
-          <mc:Fallback>
+          <mc:Fallback xmlns="">
             <p:pic>
               <p:nvPicPr>
                 <p:cNvPr id="52" name="Ink 51">
@@ -16416,8 +16417,8 @@
             </p:pic>
           </mc:Fallback>
         </mc:AlternateContent>
-        <mc:AlternateContent xmlns:mc="http://schemas.openxmlformats.org/markup-compatibility/2006">
-          <mc:Choice xmlns:p14="http://schemas.microsoft.com/office/powerpoint/2010/main" xmlns:aink="http://schemas.microsoft.com/office/drawing/2016/ink" Requires="p14 aink">
+        <mc:AlternateContent xmlns:mc="http://schemas.openxmlformats.org/markup-compatibility/2006" xmlns:p14="http://schemas.microsoft.com/office/powerpoint/2010/main" xmlns:aink="http://schemas.microsoft.com/office/drawing/2016/ink">
+          <mc:Choice Requires="p14 aink">
             <p:contentPart p14:bwMode="auto" r:id="rId100">
               <p14:nvContentPartPr>
                 <p14:cNvPr id="53" name="Ink 52">
@@ -16436,7 +16437,7 @@
               </p14:xfrm>
             </p:contentPart>
           </mc:Choice>
-          <mc:Fallback>
+          <mc:Fallback xmlns="">
             <p:pic>
               <p:nvPicPr>
                 <p:cNvPr id="53" name="Ink 52">
@@ -16468,8 +16469,8 @@
           </mc:Fallback>
         </mc:AlternateContent>
       </p:grpSp>
-      <mc:AlternateContent xmlns:mc="http://schemas.openxmlformats.org/markup-compatibility/2006">
-        <mc:Choice xmlns:p14="http://schemas.microsoft.com/office/powerpoint/2010/main" Requires="p14">
+      <mc:AlternateContent xmlns:mc="http://schemas.openxmlformats.org/markup-compatibility/2006" xmlns:p14="http://schemas.microsoft.com/office/powerpoint/2010/main">
+        <mc:Choice Requires="p14">
           <p:contentPart p14:bwMode="auto" r:id="rId102">
             <p14:nvContentPartPr>
               <p14:cNvPr id="65" name="Ink 64">
@@ -16488,7 +16489,7 @@
             </p14:xfrm>
           </p:contentPart>
         </mc:Choice>
-        <mc:Fallback>
+        <mc:Fallback xmlns="">
           <p:pic>
             <p:nvPicPr>
               <p:cNvPr id="65" name="Ink 64">
@@ -16539,8 +16540,8 @@
             <a:chExt cx="8062560" cy="3345480"/>
           </a:xfrm>
         </p:grpSpPr>
-        <mc:AlternateContent xmlns:mc="http://schemas.openxmlformats.org/markup-compatibility/2006">
-          <mc:Choice xmlns:p14="http://schemas.microsoft.com/office/powerpoint/2010/main" Requires="p14">
+        <mc:AlternateContent xmlns:mc="http://schemas.openxmlformats.org/markup-compatibility/2006" xmlns:p14="http://schemas.microsoft.com/office/powerpoint/2010/main">
+          <mc:Choice Requires="p14">
             <p:contentPart p14:bwMode="auto" r:id="rId104">
               <p14:nvContentPartPr>
                 <p14:cNvPr id="55" name="Ink 54">
@@ -16559,7 +16560,7 @@
               </p14:xfrm>
             </p:contentPart>
           </mc:Choice>
-          <mc:Fallback>
+          <mc:Fallback xmlns="">
             <p:pic>
               <p:nvPicPr>
                 <p:cNvPr id="55" name="Ink 54">
@@ -16590,8 +16591,8 @@
             </p:pic>
           </mc:Fallback>
         </mc:AlternateContent>
-        <mc:AlternateContent xmlns:mc="http://schemas.openxmlformats.org/markup-compatibility/2006">
-          <mc:Choice xmlns:p14="http://schemas.microsoft.com/office/powerpoint/2010/main" Requires="p14">
+        <mc:AlternateContent xmlns:mc="http://schemas.openxmlformats.org/markup-compatibility/2006" xmlns:p14="http://schemas.microsoft.com/office/powerpoint/2010/main">
+          <mc:Choice Requires="p14">
             <p:contentPart p14:bwMode="auto" r:id="rId106">
               <p14:nvContentPartPr>
                 <p14:cNvPr id="56" name="Ink 55">
@@ -16610,7 +16611,7 @@
               </p14:xfrm>
             </p:contentPart>
           </mc:Choice>
-          <mc:Fallback>
+          <mc:Fallback xmlns="">
             <p:pic>
               <p:nvPicPr>
                 <p:cNvPr id="56" name="Ink 55">
@@ -16641,8 +16642,8 @@
             </p:pic>
           </mc:Fallback>
         </mc:AlternateContent>
-        <mc:AlternateContent xmlns:mc="http://schemas.openxmlformats.org/markup-compatibility/2006">
-          <mc:Choice xmlns:p14="http://schemas.microsoft.com/office/powerpoint/2010/main" Requires="p14">
+        <mc:AlternateContent xmlns:mc="http://schemas.openxmlformats.org/markup-compatibility/2006" xmlns:p14="http://schemas.microsoft.com/office/powerpoint/2010/main">
+          <mc:Choice Requires="p14">
             <p:contentPart p14:bwMode="auto" r:id="rId108">
               <p14:nvContentPartPr>
                 <p14:cNvPr id="57" name="Ink 56">
@@ -16661,7 +16662,7 @@
               </p14:xfrm>
             </p:contentPart>
           </mc:Choice>
-          <mc:Fallback>
+          <mc:Fallback xmlns="">
             <p:pic>
               <p:nvPicPr>
                 <p:cNvPr id="57" name="Ink 56">
@@ -16692,8 +16693,8 @@
             </p:pic>
           </mc:Fallback>
         </mc:AlternateContent>
-        <mc:AlternateContent xmlns:mc="http://schemas.openxmlformats.org/markup-compatibility/2006">
-          <mc:Choice xmlns:p14="http://schemas.microsoft.com/office/powerpoint/2010/main" Requires="p14">
+        <mc:AlternateContent xmlns:mc="http://schemas.openxmlformats.org/markup-compatibility/2006" xmlns:p14="http://schemas.microsoft.com/office/powerpoint/2010/main">
+          <mc:Choice Requires="p14">
             <p:contentPart p14:bwMode="auto" r:id="rId110">
               <p14:nvContentPartPr>
                 <p14:cNvPr id="61" name="Ink 60">
@@ -16712,7 +16713,7 @@
               </p14:xfrm>
             </p:contentPart>
           </mc:Choice>
-          <mc:Fallback>
+          <mc:Fallback xmlns="">
             <p:pic>
               <p:nvPicPr>
                 <p:cNvPr id="61" name="Ink 60">
@@ -16743,8 +16744,8 @@
             </p:pic>
           </mc:Fallback>
         </mc:AlternateContent>
-        <mc:AlternateContent xmlns:mc="http://schemas.openxmlformats.org/markup-compatibility/2006">
-          <mc:Choice xmlns:p14="http://schemas.microsoft.com/office/powerpoint/2010/main" Requires="p14">
+        <mc:AlternateContent xmlns:mc="http://schemas.openxmlformats.org/markup-compatibility/2006" xmlns:p14="http://schemas.microsoft.com/office/powerpoint/2010/main">
+          <mc:Choice Requires="p14">
             <p:contentPart p14:bwMode="auto" r:id="rId112">
               <p14:nvContentPartPr>
                 <p14:cNvPr id="73" name="Ink 72">
@@ -16763,7 +16764,7 @@
               </p14:xfrm>
             </p:contentPart>
           </mc:Choice>
-          <mc:Fallback>
+          <mc:Fallback xmlns="">
             <p:pic>
               <p:nvPicPr>
                 <p:cNvPr id="73" name="Ink 72">
@@ -16794,8 +16795,8 @@
             </p:pic>
           </mc:Fallback>
         </mc:AlternateContent>
-        <mc:AlternateContent xmlns:mc="http://schemas.openxmlformats.org/markup-compatibility/2006">
-          <mc:Choice xmlns:p14="http://schemas.microsoft.com/office/powerpoint/2010/main" Requires="p14">
+        <mc:AlternateContent xmlns:mc="http://schemas.openxmlformats.org/markup-compatibility/2006" xmlns:p14="http://schemas.microsoft.com/office/powerpoint/2010/main">
+          <mc:Choice Requires="p14">
             <p:contentPart p14:bwMode="auto" r:id="rId114">
               <p14:nvContentPartPr>
                 <p14:cNvPr id="74" name="Ink 73">
@@ -16814,7 +16815,7 @@
               </p14:xfrm>
             </p:contentPart>
           </mc:Choice>
-          <mc:Fallback>
+          <mc:Fallback xmlns="">
             <p:pic>
               <p:nvPicPr>
                 <p:cNvPr id="74" name="Ink 73">
@@ -16845,8 +16846,8 @@
             </p:pic>
           </mc:Fallback>
         </mc:AlternateContent>
-        <mc:AlternateContent xmlns:mc="http://schemas.openxmlformats.org/markup-compatibility/2006">
-          <mc:Choice xmlns:p14="http://schemas.microsoft.com/office/powerpoint/2010/main" Requires="p14">
+        <mc:AlternateContent xmlns:mc="http://schemas.openxmlformats.org/markup-compatibility/2006" xmlns:p14="http://schemas.microsoft.com/office/powerpoint/2010/main">
+          <mc:Choice Requires="p14">
             <p:contentPart p14:bwMode="auto" r:id="rId116">
               <p14:nvContentPartPr>
                 <p14:cNvPr id="75" name="Ink 74">
@@ -16865,7 +16866,7 @@
               </p14:xfrm>
             </p:contentPart>
           </mc:Choice>
-          <mc:Fallback>
+          <mc:Fallback xmlns="">
             <p:pic>
               <p:nvPicPr>
                 <p:cNvPr id="75" name="Ink 74">
@@ -16896,8 +16897,8 @@
             </p:pic>
           </mc:Fallback>
         </mc:AlternateContent>
-        <mc:AlternateContent xmlns:mc="http://schemas.openxmlformats.org/markup-compatibility/2006">
-          <mc:Choice xmlns:p14="http://schemas.microsoft.com/office/powerpoint/2010/main" Requires="p14">
+        <mc:AlternateContent xmlns:mc="http://schemas.openxmlformats.org/markup-compatibility/2006" xmlns:p14="http://schemas.microsoft.com/office/powerpoint/2010/main">
+          <mc:Choice Requires="p14">
             <p:contentPart p14:bwMode="auto" r:id="rId118">
               <p14:nvContentPartPr>
                 <p14:cNvPr id="77" name="Ink 76">
@@ -16916,7 +16917,7 @@
               </p14:xfrm>
             </p:contentPart>
           </mc:Choice>
-          <mc:Fallback>
+          <mc:Fallback xmlns="">
             <p:pic>
               <p:nvPicPr>
                 <p:cNvPr id="77" name="Ink 76">
@@ -16947,8 +16948,8 @@
             </p:pic>
           </mc:Fallback>
         </mc:AlternateContent>
-        <mc:AlternateContent xmlns:mc="http://schemas.openxmlformats.org/markup-compatibility/2006">
-          <mc:Choice xmlns:p14="http://schemas.microsoft.com/office/powerpoint/2010/main" Requires="p14">
+        <mc:AlternateContent xmlns:mc="http://schemas.openxmlformats.org/markup-compatibility/2006" xmlns:p14="http://schemas.microsoft.com/office/powerpoint/2010/main">
+          <mc:Choice Requires="p14">
             <p:contentPart p14:bwMode="auto" r:id="rId120">
               <p14:nvContentPartPr>
                 <p14:cNvPr id="94" name="Ink 93">
@@ -16967,7 +16968,7 @@
               </p14:xfrm>
             </p:contentPart>
           </mc:Choice>
-          <mc:Fallback>
+          <mc:Fallback xmlns="">
             <p:pic>
               <p:nvPicPr>
                 <p:cNvPr id="94" name="Ink 93">
@@ -16998,8 +16999,8 @@
             </p:pic>
           </mc:Fallback>
         </mc:AlternateContent>
-        <mc:AlternateContent xmlns:mc="http://schemas.openxmlformats.org/markup-compatibility/2006">
-          <mc:Choice xmlns:p14="http://schemas.microsoft.com/office/powerpoint/2010/main" Requires="p14">
+        <mc:AlternateContent xmlns:mc="http://schemas.openxmlformats.org/markup-compatibility/2006" xmlns:p14="http://schemas.microsoft.com/office/powerpoint/2010/main">
+          <mc:Choice Requires="p14">
             <p:contentPart p14:bwMode="auto" r:id="rId122">
               <p14:nvContentPartPr>
                 <p14:cNvPr id="95" name="Ink 94">
@@ -17018,7 +17019,7 @@
               </p14:xfrm>
             </p:contentPart>
           </mc:Choice>
-          <mc:Fallback>
+          <mc:Fallback xmlns="">
             <p:pic>
               <p:nvPicPr>
                 <p:cNvPr id="95" name="Ink 94">
@@ -17049,8 +17050,8 @@
             </p:pic>
           </mc:Fallback>
         </mc:AlternateContent>
-        <mc:AlternateContent xmlns:mc="http://schemas.openxmlformats.org/markup-compatibility/2006">
-          <mc:Choice xmlns:p14="http://schemas.microsoft.com/office/powerpoint/2010/main" Requires="p14">
+        <mc:AlternateContent xmlns:mc="http://schemas.openxmlformats.org/markup-compatibility/2006" xmlns:p14="http://schemas.microsoft.com/office/powerpoint/2010/main">
+          <mc:Choice Requires="p14">
             <p:contentPart p14:bwMode="auto" r:id="rId124">
               <p14:nvContentPartPr>
                 <p14:cNvPr id="97" name="Ink 96">
@@ -17069,7 +17070,7 @@
               </p14:xfrm>
             </p:contentPart>
           </mc:Choice>
-          <mc:Fallback>
+          <mc:Fallback xmlns="">
             <p:pic>
               <p:nvPicPr>
                 <p:cNvPr id="97" name="Ink 96">
@@ -17100,8 +17101,8 @@
             </p:pic>
           </mc:Fallback>
         </mc:AlternateContent>
-        <mc:AlternateContent xmlns:mc="http://schemas.openxmlformats.org/markup-compatibility/2006">
-          <mc:Choice xmlns:p14="http://schemas.microsoft.com/office/powerpoint/2010/main" Requires="p14">
+        <mc:AlternateContent xmlns:mc="http://schemas.openxmlformats.org/markup-compatibility/2006" xmlns:p14="http://schemas.microsoft.com/office/powerpoint/2010/main">
+          <mc:Choice Requires="p14">
             <p:contentPart p14:bwMode="auto" r:id="rId126">
               <p14:nvContentPartPr>
                 <p14:cNvPr id="98" name="Ink 97">
@@ -17120,7 +17121,7 @@
               </p14:xfrm>
             </p:contentPart>
           </mc:Choice>
-          <mc:Fallback>
+          <mc:Fallback xmlns="">
             <p:pic>
               <p:nvPicPr>
                 <p:cNvPr id="98" name="Ink 97">
@@ -17151,8 +17152,8 @@
             </p:pic>
           </mc:Fallback>
         </mc:AlternateContent>
-        <mc:AlternateContent xmlns:mc="http://schemas.openxmlformats.org/markup-compatibility/2006">
-          <mc:Choice xmlns:p14="http://schemas.microsoft.com/office/powerpoint/2010/main" Requires="p14">
+        <mc:AlternateContent xmlns:mc="http://schemas.openxmlformats.org/markup-compatibility/2006" xmlns:p14="http://schemas.microsoft.com/office/powerpoint/2010/main">
+          <mc:Choice Requires="p14">
             <p:contentPart p14:bwMode="auto" r:id="rId128">
               <p14:nvContentPartPr>
                 <p14:cNvPr id="67" name="Ink 66">
@@ -17171,7 +17172,7 @@
               </p14:xfrm>
             </p:contentPart>
           </mc:Choice>
-          <mc:Fallback>
+          <mc:Fallback xmlns="">
             <p:pic>
               <p:nvPicPr>
                 <p:cNvPr id="67" name="Ink 66">
@@ -17202,8 +17203,8 @@
             </p:pic>
           </mc:Fallback>
         </mc:AlternateContent>
-        <mc:AlternateContent xmlns:mc="http://schemas.openxmlformats.org/markup-compatibility/2006">
-          <mc:Choice xmlns:p14="http://schemas.microsoft.com/office/powerpoint/2010/main" Requires="p14">
+        <mc:AlternateContent xmlns:mc="http://schemas.openxmlformats.org/markup-compatibility/2006" xmlns:p14="http://schemas.microsoft.com/office/powerpoint/2010/main">
+          <mc:Choice Requires="p14">
             <p:contentPart p14:bwMode="auto" r:id="rId130">
               <p14:nvContentPartPr>
                 <p14:cNvPr id="68" name="Ink 67">
@@ -17222,7 +17223,7 @@
               </p14:xfrm>
             </p:contentPart>
           </mc:Choice>
-          <mc:Fallback>
+          <mc:Fallback xmlns="">
             <p:pic>
               <p:nvPicPr>
                 <p:cNvPr id="68" name="Ink 67">
@@ -17253,8 +17254,8 @@
             </p:pic>
           </mc:Fallback>
         </mc:AlternateContent>
-        <mc:AlternateContent xmlns:mc="http://schemas.openxmlformats.org/markup-compatibility/2006">
-          <mc:Choice xmlns:p14="http://schemas.microsoft.com/office/powerpoint/2010/main" Requires="p14">
+        <mc:AlternateContent xmlns:mc="http://schemas.openxmlformats.org/markup-compatibility/2006" xmlns:p14="http://schemas.microsoft.com/office/powerpoint/2010/main">
+          <mc:Choice Requires="p14">
             <p:contentPart p14:bwMode="auto" r:id="rId132">
               <p14:nvContentPartPr>
                 <p14:cNvPr id="69" name="Ink 68">
@@ -17273,7 +17274,7 @@
               </p14:xfrm>
             </p:contentPart>
           </mc:Choice>
-          <mc:Fallback>
+          <mc:Fallback xmlns="">
             <p:pic>
               <p:nvPicPr>
                 <p:cNvPr id="69" name="Ink 68">
@@ -17304,8 +17305,8 @@
             </p:pic>
           </mc:Fallback>
         </mc:AlternateContent>
-        <mc:AlternateContent xmlns:mc="http://schemas.openxmlformats.org/markup-compatibility/2006">
-          <mc:Choice xmlns:p14="http://schemas.microsoft.com/office/powerpoint/2010/main" Requires="p14">
+        <mc:AlternateContent xmlns:mc="http://schemas.openxmlformats.org/markup-compatibility/2006" xmlns:p14="http://schemas.microsoft.com/office/powerpoint/2010/main">
+          <mc:Choice Requires="p14">
             <p:contentPart p14:bwMode="auto" r:id="rId134">
               <p14:nvContentPartPr>
                 <p14:cNvPr id="70" name="Ink 69">
@@ -17324,7 +17325,7 @@
               </p14:xfrm>
             </p:contentPart>
           </mc:Choice>
-          <mc:Fallback>
+          <mc:Fallback xmlns="">
             <p:pic>
               <p:nvPicPr>
                 <p:cNvPr id="70" name="Ink 69">
@@ -17355,8 +17356,8 @@
             </p:pic>
           </mc:Fallback>
         </mc:AlternateContent>
-        <mc:AlternateContent xmlns:mc="http://schemas.openxmlformats.org/markup-compatibility/2006">
-          <mc:Choice xmlns:p14="http://schemas.microsoft.com/office/powerpoint/2010/main" Requires="p14">
+        <mc:AlternateContent xmlns:mc="http://schemas.openxmlformats.org/markup-compatibility/2006" xmlns:p14="http://schemas.microsoft.com/office/powerpoint/2010/main">
+          <mc:Choice Requires="p14">
             <p:contentPart p14:bwMode="auto" r:id="rId136">
               <p14:nvContentPartPr>
                 <p14:cNvPr id="71" name="Ink 70">
@@ -17375,7 +17376,7 @@
               </p14:xfrm>
             </p:contentPart>
           </mc:Choice>
-          <mc:Fallback>
+          <mc:Fallback xmlns="">
             <p:pic>
               <p:nvPicPr>
                 <p:cNvPr id="71" name="Ink 70">
@@ -17406,8 +17407,8 @@
             </p:pic>
           </mc:Fallback>
         </mc:AlternateContent>
-        <mc:AlternateContent xmlns:mc="http://schemas.openxmlformats.org/markup-compatibility/2006">
-          <mc:Choice xmlns:p14="http://schemas.microsoft.com/office/powerpoint/2010/main" Requires="p14">
+        <mc:AlternateContent xmlns:mc="http://schemas.openxmlformats.org/markup-compatibility/2006" xmlns:p14="http://schemas.microsoft.com/office/powerpoint/2010/main">
+          <mc:Choice Requires="p14">
             <p:contentPart p14:bwMode="auto" r:id="rId138">
               <p14:nvContentPartPr>
                 <p14:cNvPr id="79" name="Ink 78">
@@ -17426,7 +17427,7 @@
               </p14:xfrm>
             </p:contentPart>
           </mc:Choice>
-          <mc:Fallback>
+          <mc:Fallback xmlns="">
             <p:pic>
               <p:nvPicPr>
                 <p:cNvPr id="79" name="Ink 78">
@@ -17457,8 +17458,8 @@
             </p:pic>
           </mc:Fallback>
         </mc:AlternateContent>
-        <mc:AlternateContent xmlns:mc="http://schemas.openxmlformats.org/markup-compatibility/2006">
-          <mc:Choice xmlns:p14="http://schemas.microsoft.com/office/powerpoint/2010/main" Requires="p14">
+        <mc:AlternateContent xmlns:mc="http://schemas.openxmlformats.org/markup-compatibility/2006" xmlns:p14="http://schemas.microsoft.com/office/powerpoint/2010/main">
+          <mc:Choice Requires="p14">
             <p:contentPart p14:bwMode="auto" r:id="rId140">
               <p14:nvContentPartPr>
                 <p14:cNvPr id="80" name="Ink 79">
@@ -17477,7 +17478,7 @@
               </p14:xfrm>
             </p:contentPart>
           </mc:Choice>
-          <mc:Fallback>
+          <mc:Fallback xmlns="">
             <p:pic>
               <p:nvPicPr>
                 <p:cNvPr id="80" name="Ink 79">
@@ -17508,8 +17509,8 @@
             </p:pic>
           </mc:Fallback>
         </mc:AlternateContent>
-        <mc:AlternateContent xmlns:mc="http://schemas.openxmlformats.org/markup-compatibility/2006">
-          <mc:Choice xmlns:p14="http://schemas.microsoft.com/office/powerpoint/2010/main" Requires="p14">
+        <mc:AlternateContent xmlns:mc="http://schemas.openxmlformats.org/markup-compatibility/2006" xmlns:p14="http://schemas.microsoft.com/office/powerpoint/2010/main">
+          <mc:Choice Requires="p14">
             <p:contentPart p14:bwMode="auto" r:id="rId142">
               <p14:nvContentPartPr>
                 <p14:cNvPr id="100" name="Ink 99">
@@ -17528,7 +17529,7 @@
               </p14:xfrm>
             </p:contentPart>
           </mc:Choice>
-          <mc:Fallback>
+          <mc:Fallback xmlns="">
             <p:pic>
               <p:nvPicPr>
                 <p:cNvPr id="100" name="Ink 99">
@@ -17559,8 +17560,8 @@
             </p:pic>
           </mc:Fallback>
         </mc:AlternateContent>
-        <mc:AlternateContent xmlns:mc="http://schemas.openxmlformats.org/markup-compatibility/2006">
-          <mc:Choice xmlns:p14="http://schemas.microsoft.com/office/powerpoint/2010/main" Requires="p14">
+        <mc:AlternateContent xmlns:mc="http://schemas.openxmlformats.org/markup-compatibility/2006" xmlns:p14="http://schemas.microsoft.com/office/powerpoint/2010/main">
+          <mc:Choice Requires="p14">
             <p:contentPart p14:bwMode="auto" r:id="rId144">
               <p14:nvContentPartPr>
                 <p14:cNvPr id="101" name="Ink 100">
@@ -17579,7 +17580,7 @@
               </p14:xfrm>
             </p:contentPart>
           </mc:Choice>
-          <mc:Fallback>
+          <mc:Fallback xmlns="">
             <p:pic>
               <p:nvPicPr>
                 <p:cNvPr id="101" name="Ink 100">
@@ -17610,8 +17611,8 @@
             </p:pic>
           </mc:Fallback>
         </mc:AlternateContent>
-        <mc:AlternateContent xmlns:mc="http://schemas.openxmlformats.org/markup-compatibility/2006">
-          <mc:Choice xmlns:p14="http://schemas.microsoft.com/office/powerpoint/2010/main" Requires="p14">
+        <mc:AlternateContent xmlns:mc="http://schemas.openxmlformats.org/markup-compatibility/2006" xmlns:p14="http://schemas.microsoft.com/office/powerpoint/2010/main">
+          <mc:Choice Requires="p14">
             <p:contentPart p14:bwMode="auto" r:id="rId146">
               <p14:nvContentPartPr>
                 <p14:cNvPr id="103" name="Ink 102">
@@ -17630,7 +17631,7 @@
               </p14:xfrm>
             </p:contentPart>
           </mc:Choice>
-          <mc:Fallback>
+          <mc:Fallback xmlns="">
             <p:pic>
               <p:nvPicPr>
                 <p:cNvPr id="103" name="Ink 102">
@@ -17661,8 +17662,8 @@
             </p:pic>
           </mc:Fallback>
         </mc:AlternateContent>
-        <mc:AlternateContent xmlns:mc="http://schemas.openxmlformats.org/markup-compatibility/2006">
-          <mc:Choice xmlns:p14="http://schemas.microsoft.com/office/powerpoint/2010/main" Requires="p14">
+        <mc:AlternateContent xmlns:mc="http://schemas.openxmlformats.org/markup-compatibility/2006" xmlns:p14="http://schemas.microsoft.com/office/powerpoint/2010/main">
+          <mc:Choice Requires="p14">
             <p:contentPart p14:bwMode="auto" r:id="rId148">
               <p14:nvContentPartPr>
                 <p14:cNvPr id="105" name="Ink 104">
@@ -17681,7 +17682,7 @@
               </p14:xfrm>
             </p:contentPart>
           </mc:Choice>
-          <mc:Fallback>
+          <mc:Fallback xmlns="">
             <p:pic>
               <p:nvPicPr>
                 <p:cNvPr id="105" name="Ink 104">
@@ -17712,8 +17713,8 @@
             </p:pic>
           </mc:Fallback>
         </mc:AlternateContent>
-        <mc:AlternateContent xmlns:mc="http://schemas.openxmlformats.org/markup-compatibility/2006">
-          <mc:Choice xmlns:p14="http://schemas.microsoft.com/office/powerpoint/2010/main" Requires="p14">
+        <mc:AlternateContent xmlns:mc="http://schemas.openxmlformats.org/markup-compatibility/2006" xmlns:p14="http://schemas.microsoft.com/office/powerpoint/2010/main">
+          <mc:Choice Requires="p14">
             <p:contentPart p14:bwMode="auto" r:id="rId150">
               <p14:nvContentPartPr>
                 <p14:cNvPr id="106" name="Ink 105">
@@ -17732,7 +17733,7 @@
               </p14:xfrm>
             </p:contentPart>
           </mc:Choice>
-          <mc:Fallback>
+          <mc:Fallback xmlns="">
             <p:pic>
               <p:nvPicPr>
                 <p:cNvPr id="106" name="Ink 105">
@@ -17763,8 +17764,8 @@
             </p:pic>
           </mc:Fallback>
         </mc:AlternateContent>
-        <mc:AlternateContent xmlns:mc="http://schemas.openxmlformats.org/markup-compatibility/2006">
-          <mc:Choice xmlns:p14="http://schemas.microsoft.com/office/powerpoint/2010/main" Requires="p14">
+        <mc:AlternateContent xmlns:mc="http://schemas.openxmlformats.org/markup-compatibility/2006" xmlns:p14="http://schemas.microsoft.com/office/powerpoint/2010/main">
+          <mc:Choice Requires="p14">
             <p:contentPart p14:bwMode="auto" r:id="rId152">
               <p14:nvContentPartPr>
                 <p14:cNvPr id="108" name="Ink 107">
@@ -17783,7 +17784,7 @@
               </p14:xfrm>
             </p:contentPart>
           </mc:Choice>
-          <mc:Fallback>
+          <mc:Fallback xmlns="">
             <p:pic>
               <p:nvPicPr>
                 <p:cNvPr id="108" name="Ink 107">
@@ -17814,8 +17815,8 @@
             </p:pic>
           </mc:Fallback>
         </mc:AlternateContent>
-        <mc:AlternateContent xmlns:mc="http://schemas.openxmlformats.org/markup-compatibility/2006">
-          <mc:Choice xmlns:p14="http://schemas.microsoft.com/office/powerpoint/2010/main" Requires="p14">
+        <mc:AlternateContent xmlns:mc="http://schemas.openxmlformats.org/markup-compatibility/2006" xmlns:p14="http://schemas.microsoft.com/office/powerpoint/2010/main">
+          <mc:Choice Requires="p14">
             <p:contentPart p14:bwMode="auto" r:id="rId154">
               <p14:nvContentPartPr>
                 <p14:cNvPr id="109" name="Ink 108">
@@ -17834,7 +17835,7 @@
               </p14:xfrm>
             </p:contentPart>
           </mc:Choice>
-          <mc:Fallback>
+          <mc:Fallback xmlns="">
             <p:pic>
               <p:nvPicPr>
                 <p:cNvPr id="109" name="Ink 108">
@@ -17865,8 +17866,8 @@
             </p:pic>
           </mc:Fallback>
         </mc:AlternateContent>
-        <mc:AlternateContent xmlns:mc="http://schemas.openxmlformats.org/markup-compatibility/2006">
-          <mc:Choice xmlns:p14="http://schemas.microsoft.com/office/powerpoint/2010/main" Requires="p14">
+        <mc:AlternateContent xmlns:mc="http://schemas.openxmlformats.org/markup-compatibility/2006" xmlns:p14="http://schemas.microsoft.com/office/powerpoint/2010/main">
+          <mc:Choice Requires="p14">
             <p:contentPart p14:bwMode="auto" r:id="rId156">
               <p14:nvContentPartPr>
                 <p14:cNvPr id="111" name="Ink 110">
@@ -17885,7 +17886,7 @@
               </p14:xfrm>
             </p:contentPart>
           </mc:Choice>
-          <mc:Fallback>
+          <mc:Fallback xmlns="">
             <p:pic>
               <p:nvPicPr>
                 <p:cNvPr id="111" name="Ink 110">
@@ -17916,8 +17917,8 @@
             </p:pic>
           </mc:Fallback>
         </mc:AlternateContent>
-        <mc:AlternateContent xmlns:mc="http://schemas.openxmlformats.org/markup-compatibility/2006">
-          <mc:Choice xmlns:p14="http://schemas.microsoft.com/office/powerpoint/2010/main" Requires="p14">
+        <mc:AlternateContent xmlns:mc="http://schemas.openxmlformats.org/markup-compatibility/2006" xmlns:p14="http://schemas.microsoft.com/office/powerpoint/2010/main">
+          <mc:Choice Requires="p14">
             <p:contentPart p14:bwMode="auto" r:id="rId158">
               <p14:nvContentPartPr>
                 <p14:cNvPr id="112" name="Ink 111">
@@ -17936,7 +17937,7 @@
               </p14:xfrm>
             </p:contentPart>
           </mc:Choice>
-          <mc:Fallback>
+          <mc:Fallback xmlns="">
             <p:pic>
               <p:nvPicPr>
                 <p:cNvPr id="112" name="Ink 111">
@@ -17967,8 +17968,8 @@
             </p:pic>
           </mc:Fallback>
         </mc:AlternateContent>
-        <mc:AlternateContent xmlns:mc="http://schemas.openxmlformats.org/markup-compatibility/2006">
-          <mc:Choice xmlns:p14="http://schemas.microsoft.com/office/powerpoint/2010/main" Requires="p14">
+        <mc:AlternateContent xmlns:mc="http://schemas.openxmlformats.org/markup-compatibility/2006" xmlns:p14="http://schemas.microsoft.com/office/powerpoint/2010/main">
+          <mc:Choice Requires="p14">
             <p:contentPart p14:bwMode="auto" r:id="rId160">
               <p14:nvContentPartPr>
                 <p14:cNvPr id="114" name="Ink 113">
@@ -17987,7 +17988,7 @@
               </p14:xfrm>
             </p:contentPart>
           </mc:Choice>
-          <mc:Fallback>
+          <mc:Fallback xmlns="">
             <p:pic>
               <p:nvPicPr>
                 <p:cNvPr id="114" name="Ink 113">
@@ -18018,8 +18019,8 @@
             </p:pic>
           </mc:Fallback>
         </mc:AlternateContent>
-        <mc:AlternateContent xmlns:mc="http://schemas.openxmlformats.org/markup-compatibility/2006">
-          <mc:Choice xmlns:p14="http://schemas.microsoft.com/office/powerpoint/2010/main" Requires="p14">
+        <mc:AlternateContent xmlns:mc="http://schemas.openxmlformats.org/markup-compatibility/2006" xmlns:p14="http://schemas.microsoft.com/office/powerpoint/2010/main">
+          <mc:Choice Requires="p14">
             <p:contentPart p14:bwMode="auto" r:id="rId162">
               <p14:nvContentPartPr>
                 <p14:cNvPr id="116" name="Ink 115">
@@ -18038,7 +18039,7 @@
               </p14:xfrm>
             </p:contentPart>
           </mc:Choice>
-          <mc:Fallback>
+          <mc:Fallback xmlns="">
             <p:pic>
               <p:nvPicPr>
                 <p:cNvPr id="116" name="Ink 115">
@@ -18069,8 +18070,8 @@
             </p:pic>
           </mc:Fallback>
         </mc:AlternateContent>
-        <mc:AlternateContent xmlns:mc="http://schemas.openxmlformats.org/markup-compatibility/2006">
-          <mc:Choice xmlns:p14="http://schemas.microsoft.com/office/powerpoint/2010/main" Requires="p14">
+        <mc:AlternateContent xmlns:mc="http://schemas.openxmlformats.org/markup-compatibility/2006" xmlns:p14="http://schemas.microsoft.com/office/powerpoint/2010/main">
+          <mc:Choice Requires="p14">
             <p:contentPart p14:bwMode="auto" r:id="rId164">
               <p14:nvContentPartPr>
                 <p14:cNvPr id="118" name="Ink 117">
@@ -18089,7 +18090,7 @@
               </p14:xfrm>
             </p:contentPart>
           </mc:Choice>
-          <mc:Fallback>
+          <mc:Fallback xmlns="">
             <p:pic>
               <p:nvPicPr>
                 <p:cNvPr id="118" name="Ink 117">
@@ -18120,8 +18121,8 @@
             </p:pic>
           </mc:Fallback>
         </mc:AlternateContent>
-        <mc:AlternateContent xmlns:mc="http://schemas.openxmlformats.org/markup-compatibility/2006">
-          <mc:Choice xmlns:p14="http://schemas.microsoft.com/office/powerpoint/2010/main" Requires="p14">
+        <mc:AlternateContent xmlns:mc="http://schemas.openxmlformats.org/markup-compatibility/2006" xmlns:p14="http://schemas.microsoft.com/office/powerpoint/2010/main">
+          <mc:Choice Requires="p14">
             <p:contentPart p14:bwMode="auto" r:id="rId166">
               <p14:nvContentPartPr>
                 <p14:cNvPr id="122" name="Ink 121">
@@ -18140,7 +18141,7 @@
               </p14:xfrm>
             </p:contentPart>
           </mc:Choice>
-          <mc:Fallback>
+          <mc:Fallback xmlns="">
             <p:pic>
               <p:nvPicPr>
                 <p:cNvPr id="122" name="Ink 121">
@@ -18171,8 +18172,8 @@
             </p:pic>
           </mc:Fallback>
         </mc:AlternateContent>
-        <mc:AlternateContent xmlns:mc="http://schemas.openxmlformats.org/markup-compatibility/2006">
-          <mc:Choice xmlns:p14="http://schemas.microsoft.com/office/powerpoint/2010/main" Requires="p14">
+        <mc:AlternateContent xmlns:mc="http://schemas.openxmlformats.org/markup-compatibility/2006" xmlns:p14="http://schemas.microsoft.com/office/powerpoint/2010/main">
+          <mc:Choice Requires="p14">
             <p:contentPart p14:bwMode="auto" r:id="rId168">
               <p14:nvContentPartPr>
                 <p14:cNvPr id="82" name="Ink 81">
@@ -18191,7 +18192,7 @@
               </p14:xfrm>
             </p:contentPart>
           </mc:Choice>
-          <mc:Fallback>
+          <mc:Fallback xmlns="">
             <p:pic>
               <p:nvPicPr>
                 <p:cNvPr id="82" name="Ink 81">
@@ -18222,8 +18223,8 @@
             </p:pic>
           </mc:Fallback>
         </mc:AlternateContent>
-        <mc:AlternateContent xmlns:mc="http://schemas.openxmlformats.org/markup-compatibility/2006">
-          <mc:Choice xmlns:p14="http://schemas.microsoft.com/office/powerpoint/2010/main" Requires="p14">
+        <mc:AlternateContent xmlns:mc="http://schemas.openxmlformats.org/markup-compatibility/2006" xmlns:p14="http://schemas.microsoft.com/office/powerpoint/2010/main">
+          <mc:Choice Requires="p14">
             <p:contentPart p14:bwMode="auto" r:id="rId170">
               <p14:nvContentPartPr>
                 <p14:cNvPr id="83" name="Ink 82">
@@ -18242,7 +18243,7 @@
               </p14:xfrm>
             </p:contentPart>
           </mc:Choice>
-          <mc:Fallback>
+          <mc:Fallback xmlns="">
             <p:pic>
               <p:nvPicPr>
                 <p:cNvPr id="83" name="Ink 82">
@@ -18273,8 +18274,8 @@
             </p:pic>
           </mc:Fallback>
         </mc:AlternateContent>
-        <mc:AlternateContent xmlns:mc="http://schemas.openxmlformats.org/markup-compatibility/2006">
-          <mc:Choice xmlns:p14="http://schemas.microsoft.com/office/powerpoint/2010/main" Requires="p14">
+        <mc:AlternateContent xmlns:mc="http://schemas.openxmlformats.org/markup-compatibility/2006" xmlns:p14="http://schemas.microsoft.com/office/powerpoint/2010/main">
+          <mc:Choice Requires="p14">
             <p:contentPart p14:bwMode="auto" r:id="rId172">
               <p14:nvContentPartPr>
                 <p14:cNvPr id="84" name="Ink 83">
@@ -18293,7 +18294,7 @@
               </p14:xfrm>
             </p:contentPart>
           </mc:Choice>
-          <mc:Fallback>
+          <mc:Fallback xmlns="">
             <p:pic>
               <p:nvPicPr>
                 <p:cNvPr id="84" name="Ink 83">
@@ -18324,8 +18325,8 @@
             </p:pic>
           </mc:Fallback>
         </mc:AlternateContent>
-        <mc:AlternateContent xmlns:mc="http://schemas.openxmlformats.org/markup-compatibility/2006">
-          <mc:Choice xmlns:p14="http://schemas.microsoft.com/office/powerpoint/2010/main" Requires="p14">
+        <mc:AlternateContent xmlns:mc="http://schemas.openxmlformats.org/markup-compatibility/2006" xmlns:p14="http://schemas.microsoft.com/office/powerpoint/2010/main">
+          <mc:Choice Requires="p14">
             <p:contentPart p14:bwMode="auto" r:id="rId174">
               <p14:nvContentPartPr>
                 <p14:cNvPr id="85" name="Ink 84">
@@ -18344,7 +18345,7 @@
               </p14:xfrm>
             </p:contentPart>
           </mc:Choice>
-          <mc:Fallback>
+          <mc:Fallback xmlns="">
             <p:pic>
               <p:nvPicPr>
                 <p:cNvPr id="85" name="Ink 84">
@@ -18375,8 +18376,8 @@
             </p:pic>
           </mc:Fallback>
         </mc:AlternateContent>
-        <mc:AlternateContent xmlns:mc="http://schemas.openxmlformats.org/markup-compatibility/2006">
-          <mc:Choice xmlns:p14="http://schemas.microsoft.com/office/powerpoint/2010/main" Requires="p14">
+        <mc:AlternateContent xmlns:mc="http://schemas.openxmlformats.org/markup-compatibility/2006" xmlns:p14="http://schemas.microsoft.com/office/powerpoint/2010/main">
+          <mc:Choice Requires="p14">
             <p:contentPart p14:bwMode="auto" r:id="rId176">
               <p14:nvContentPartPr>
                 <p14:cNvPr id="86" name="Ink 85">
@@ -18395,7 +18396,7 @@
               </p14:xfrm>
             </p:contentPart>
           </mc:Choice>
-          <mc:Fallback>
+          <mc:Fallback xmlns="">
             <p:pic>
               <p:nvPicPr>
                 <p:cNvPr id="86" name="Ink 85">
@@ -18426,8 +18427,8 @@
             </p:pic>
           </mc:Fallback>
         </mc:AlternateContent>
-        <mc:AlternateContent xmlns:mc="http://schemas.openxmlformats.org/markup-compatibility/2006">
-          <mc:Choice xmlns:p14="http://schemas.microsoft.com/office/powerpoint/2010/main" Requires="p14">
+        <mc:AlternateContent xmlns:mc="http://schemas.openxmlformats.org/markup-compatibility/2006" xmlns:p14="http://schemas.microsoft.com/office/powerpoint/2010/main">
+          <mc:Choice Requires="p14">
             <p:contentPart p14:bwMode="auto" r:id="rId178">
               <p14:nvContentPartPr>
                 <p14:cNvPr id="87" name="Ink 86">
@@ -18446,7 +18447,7 @@
               </p14:xfrm>
             </p:contentPart>
           </mc:Choice>
-          <mc:Fallback>
+          <mc:Fallback xmlns="">
             <p:pic>
               <p:nvPicPr>
                 <p:cNvPr id="87" name="Ink 86">
@@ -18477,8 +18478,8 @@
             </p:pic>
           </mc:Fallback>
         </mc:AlternateContent>
-        <mc:AlternateContent xmlns:mc="http://schemas.openxmlformats.org/markup-compatibility/2006">
-          <mc:Choice xmlns:p14="http://schemas.microsoft.com/office/powerpoint/2010/main" Requires="p14">
+        <mc:AlternateContent xmlns:mc="http://schemas.openxmlformats.org/markup-compatibility/2006" xmlns:p14="http://schemas.microsoft.com/office/powerpoint/2010/main">
+          <mc:Choice Requires="p14">
             <p:contentPart p14:bwMode="auto" r:id="rId180">
               <p14:nvContentPartPr>
                 <p14:cNvPr id="88" name="Ink 87">
@@ -18497,7 +18498,7 @@
               </p14:xfrm>
             </p:contentPart>
           </mc:Choice>
-          <mc:Fallback>
+          <mc:Fallback xmlns="">
             <p:pic>
               <p:nvPicPr>
                 <p:cNvPr id="88" name="Ink 87">
@@ -18528,8 +18529,8 @@
             </p:pic>
           </mc:Fallback>
         </mc:AlternateContent>
-        <mc:AlternateContent xmlns:mc="http://schemas.openxmlformats.org/markup-compatibility/2006">
-          <mc:Choice xmlns:p14="http://schemas.microsoft.com/office/powerpoint/2010/main" Requires="p14">
+        <mc:AlternateContent xmlns:mc="http://schemas.openxmlformats.org/markup-compatibility/2006" xmlns:p14="http://schemas.microsoft.com/office/powerpoint/2010/main">
+          <mc:Choice Requires="p14">
             <p:contentPart p14:bwMode="auto" r:id="rId182">
               <p14:nvContentPartPr>
                 <p14:cNvPr id="89" name="Ink 88">
@@ -18548,7 +18549,7 @@
               </p14:xfrm>
             </p:contentPart>
           </mc:Choice>
-          <mc:Fallback>
+          <mc:Fallback xmlns="">
             <p:pic>
               <p:nvPicPr>
                 <p:cNvPr id="89" name="Ink 88">
@@ -18579,8 +18580,8 @@
             </p:pic>
           </mc:Fallback>
         </mc:AlternateContent>
-        <mc:AlternateContent xmlns:mc="http://schemas.openxmlformats.org/markup-compatibility/2006">
-          <mc:Choice xmlns:p14="http://schemas.microsoft.com/office/powerpoint/2010/main" Requires="p14">
+        <mc:AlternateContent xmlns:mc="http://schemas.openxmlformats.org/markup-compatibility/2006" xmlns:p14="http://schemas.microsoft.com/office/powerpoint/2010/main">
+          <mc:Choice Requires="p14">
             <p:contentPart p14:bwMode="auto" r:id="rId184">
               <p14:nvContentPartPr>
                 <p14:cNvPr id="90" name="Ink 89">
@@ -18599,7 +18600,7 @@
               </p14:xfrm>
             </p:contentPart>
           </mc:Choice>
-          <mc:Fallback>
+          <mc:Fallback xmlns="">
             <p:pic>
               <p:nvPicPr>
                 <p:cNvPr id="90" name="Ink 89">
@@ -18630,8 +18631,8 @@
             </p:pic>
           </mc:Fallback>
         </mc:AlternateContent>
-        <mc:AlternateContent xmlns:mc="http://schemas.openxmlformats.org/markup-compatibility/2006">
-          <mc:Choice xmlns:p14="http://schemas.microsoft.com/office/powerpoint/2010/main" Requires="p14">
+        <mc:AlternateContent xmlns:mc="http://schemas.openxmlformats.org/markup-compatibility/2006" xmlns:p14="http://schemas.microsoft.com/office/powerpoint/2010/main">
+          <mc:Choice Requires="p14">
             <p:contentPart p14:bwMode="auto" r:id="rId186">
               <p14:nvContentPartPr>
                 <p14:cNvPr id="92" name="Ink 91">
@@ -18650,7 +18651,7 @@
               </p14:xfrm>
             </p:contentPart>
           </mc:Choice>
-          <mc:Fallback>
+          <mc:Fallback xmlns="">
             <p:pic>
               <p:nvPicPr>
                 <p:cNvPr id="92" name="Ink 91">
@@ -18681,8 +18682,8 @@
             </p:pic>
           </mc:Fallback>
         </mc:AlternateContent>
-        <mc:AlternateContent xmlns:mc="http://schemas.openxmlformats.org/markup-compatibility/2006">
-          <mc:Choice xmlns:p14="http://schemas.microsoft.com/office/powerpoint/2010/main" Requires="p14">
+        <mc:AlternateContent xmlns:mc="http://schemas.openxmlformats.org/markup-compatibility/2006" xmlns:p14="http://schemas.microsoft.com/office/powerpoint/2010/main">
+          <mc:Choice Requires="p14">
             <p:contentPart p14:bwMode="auto" r:id="rId188">
               <p14:nvContentPartPr>
                 <p14:cNvPr id="120" name="Ink 119">
@@ -18701,7 +18702,7 @@
               </p14:xfrm>
             </p:contentPart>
           </mc:Choice>
-          <mc:Fallback>
+          <mc:Fallback xmlns="">
             <p:pic>
               <p:nvPicPr>
                 <p:cNvPr id="120" name="Ink 119">
@@ -18732,8 +18733,8 @@
             </p:pic>
           </mc:Fallback>
         </mc:AlternateContent>
-        <mc:AlternateContent xmlns:mc="http://schemas.openxmlformats.org/markup-compatibility/2006">
-          <mc:Choice xmlns:p14="http://schemas.microsoft.com/office/powerpoint/2010/main" Requires="p14">
+        <mc:AlternateContent xmlns:mc="http://schemas.openxmlformats.org/markup-compatibility/2006" xmlns:p14="http://schemas.microsoft.com/office/powerpoint/2010/main">
+          <mc:Choice Requires="p14">
             <p:contentPart p14:bwMode="auto" r:id="rId190">
               <p14:nvContentPartPr>
                 <p14:cNvPr id="121" name="Ink 120">
@@ -18752,7 +18753,7 @@
               </p14:xfrm>
             </p:contentPart>
           </mc:Choice>
-          <mc:Fallback>
+          <mc:Fallback xmlns="">
             <p:pic>
               <p:nvPicPr>
                 <p:cNvPr id="121" name="Ink 120">
@@ -18783,8 +18784,8 @@
             </p:pic>
           </mc:Fallback>
         </mc:AlternateContent>
-        <mc:AlternateContent xmlns:mc="http://schemas.openxmlformats.org/markup-compatibility/2006">
-          <mc:Choice xmlns:p14="http://schemas.microsoft.com/office/powerpoint/2010/main" Requires="p14">
+        <mc:AlternateContent xmlns:mc="http://schemas.openxmlformats.org/markup-compatibility/2006" xmlns:p14="http://schemas.microsoft.com/office/powerpoint/2010/main">
+          <mc:Choice Requires="p14">
             <p:contentPart p14:bwMode="auto" r:id="rId192">
               <p14:nvContentPartPr>
                 <p14:cNvPr id="123" name="Ink 122">
@@ -18803,7 +18804,7 @@
               </p14:xfrm>
             </p:contentPart>
           </mc:Choice>
-          <mc:Fallback>
+          <mc:Fallback xmlns="">
             <p:pic>
               <p:nvPicPr>
                 <p:cNvPr id="123" name="Ink 122">
@@ -18855,8 +18856,8 @@
             <a:chExt cx="9721080" cy="5005440"/>
           </a:xfrm>
         </p:grpSpPr>
-        <mc:AlternateContent xmlns:mc="http://schemas.openxmlformats.org/markup-compatibility/2006">
-          <mc:Choice xmlns:p14="http://schemas.microsoft.com/office/powerpoint/2010/main" Requires="p14">
+        <mc:AlternateContent xmlns:mc="http://schemas.openxmlformats.org/markup-compatibility/2006" xmlns:p14="http://schemas.microsoft.com/office/powerpoint/2010/main">
+          <mc:Choice Requires="p14">
             <p:contentPart p14:bwMode="auto" r:id="rId194">
               <p14:nvContentPartPr>
                 <p14:cNvPr id="126" name="Ink 125">
@@ -18875,7 +18876,7 @@
               </p14:xfrm>
             </p:contentPart>
           </mc:Choice>
-          <mc:Fallback>
+          <mc:Fallback xmlns="">
             <p:pic>
               <p:nvPicPr>
                 <p:cNvPr id="126" name="Ink 125">
@@ -18906,8 +18907,8 @@
             </p:pic>
           </mc:Fallback>
         </mc:AlternateContent>
-        <mc:AlternateContent xmlns:mc="http://schemas.openxmlformats.org/markup-compatibility/2006">
-          <mc:Choice xmlns:p14="http://schemas.microsoft.com/office/powerpoint/2010/main" Requires="p14">
+        <mc:AlternateContent xmlns:mc="http://schemas.openxmlformats.org/markup-compatibility/2006" xmlns:p14="http://schemas.microsoft.com/office/powerpoint/2010/main">
+          <mc:Choice Requires="p14">
             <p:contentPart p14:bwMode="auto" r:id="rId196">
               <p14:nvContentPartPr>
                 <p14:cNvPr id="127" name="Ink 126">
@@ -18926,7 +18927,7 @@
               </p14:xfrm>
             </p:contentPart>
           </mc:Choice>
-          <mc:Fallback>
+          <mc:Fallback xmlns="">
             <p:pic>
               <p:nvPicPr>
                 <p:cNvPr id="127" name="Ink 126">
@@ -18957,8 +18958,8 @@
             </p:pic>
           </mc:Fallback>
         </mc:AlternateContent>
-        <mc:AlternateContent xmlns:mc="http://schemas.openxmlformats.org/markup-compatibility/2006">
-          <mc:Choice xmlns:p14="http://schemas.microsoft.com/office/powerpoint/2010/main" Requires="p14">
+        <mc:AlternateContent xmlns:mc="http://schemas.openxmlformats.org/markup-compatibility/2006" xmlns:p14="http://schemas.microsoft.com/office/powerpoint/2010/main">
+          <mc:Choice Requires="p14">
             <p:contentPart p14:bwMode="auto" r:id="rId198">
               <p14:nvContentPartPr>
                 <p14:cNvPr id="128" name="Ink 127">
@@ -18977,7 +18978,7 @@
               </p14:xfrm>
             </p:contentPart>
           </mc:Choice>
-          <mc:Fallback>
+          <mc:Fallback xmlns="">
             <p:pic>
               <p:nvPicPr>
                 <p:cNvPr id="128" name="Ink 127">
@@ -19008,8 +19009,8 @@
             </p:pic>
           </mc:Fallback>
         </mc:AlternateContent>
-        <mc:AlternateContent xmlns:mc="http://schemas.openxmlformats.org/markup-compatibility/2006">
-          <mc:Choice xmlns:p14="http://schemas.microsoft.com/office/powerpoint/2010/main" Requires="p14">
+        <mc:AlternateContent xmlns:mc="http://schemas.openxmlformats.org/markup-compatibility/2006" xmlns:p14="http://schemas.microsoft.com/office/powerpoint/2010/main">
+          <mc:Choice Requires="p14">
             <p:contentPart p14:bwMode="auto" r:id="rId200">
               <p14:nvContentPartPr>
                 <p14:cNvPr id="129" name="Ink 128">
@@ -19028,7 +19029,7 @@
               </p14:xfrm>
             </p:contentPart>
           </mc:Choice>
-          <mc:Fallback>
+          <mc:Fallback xmlns="">
             <p:pic>
               <p:nvPicPr>
                 <p:cNvPr id="129" name="Ink 128">
@@ -19059,8 +19060,8 @@
             </p:pic>
           </mc:Fallback>
         </mc:AlternateContent>
-        <mc:AlternateContent xmlns:mc="http://schemas.openxmlformats.org/markup-compatibility/2006">
-          <mc:Choice xmlns:p14="http://schemas.microsoft.com/office/powerpoint/2010/main" Requires="p14">
+        <mc:AlternateContent xmlns:mc="http://schemas.openxmlformats.org/markup-compatibility/2006" xmlns:p14="http://schemas.microsoft.com/office/powerpoint/2010/main">
+          <mc:Choice Requires="p14">
             <p:contentPart p14:bwMode="auto" r:id="rId202">
               <p14:nvContentPartPr>
                 <p14:cNvPr id="130" name="Ink 129">
@@ -19079,7 +19080,7 @@
               </p14:xfrm>
             </p:contentPart>
           </mc:Choice>
-          <mc:Fallback>
+          <mc:Fallback xmlns="">
             <p:pic>
               <p:nvPicPr>
                 <p:cNvPr id="130" name="Ink 129">
@@ -19110,8 +19111,8 @@
             </p:pic>
           </mc:Fallback>
         </mc:AlternateContent>
-        <mc:AlternateContent xmlns:mc="http://schemas.openxmlformats.org/markup-compatibility/2006">
-          <mc:Choice xmlns:p14="http://schemas.microsoft.com/office/powerpoint/2010/main" Requires="p14">
+        <mc:AlternateContent xmlns:mc="http://schemas.openxmlformats.org/markup-compatibility/2006" xmlns:p14="http://schemas.microsoft.com/office/powerpoint/2010/main">
+          <mc:Choice Requires="p14">
             <p:contentPart p14:bwMode="auto" r:id="rId204">
               <p14:nvContentPartPr>
                 <p14:cNvPr id="131" name="Ink 130">
@@ -19130,7 +19131,7 @@
               </p14:xfrm>
             </p:contentPart>
           </mc:Choice>
-          <mc:Fallback>
+          <mc:Fallback xmlns="">
             <p:pic>
               <p:nvPicPr>
                 <p:cNvPr id="131" name="Ink 130">
@@ -19161,8 +19162,8 @@
             </p:pic>
           </mc:Fallback>
         </mc:AlternateContent>
-        <mc:AlternateContent xmlns:mc="http://schemas.openxmlformats.org/markup-compatibility/2006">
-          <mc:Choice xmlns:p14="http://schemas.microsoft.com/office/powerpoint/2010/main" Requires="p14">
+        <mc:AlternateContent xmlns:mc="http://schemas.openxmlformats.org/markup-compatibility/2006" xmlns:p14="http://schemas.microsoft.com/office/powerpoint/2010/main">
+          <mc:Choice Requires="p14">
             <p:contentPart p14:bwMode="auto" r:id="rId206">
               <p14:nvContentPartPr>
                 <p14:cNvPr id="133" name="Ink 132">
@@ -19181,7 +19182,7 @@
               </p14:xfrm>
             </p:contentPart>
           </mc:Choice>
-          <mc:Fallback>
+          <mc:Fallback xmlns="">
             <p:pic>
               <p:nvPicPr>
                 <p:cNvPr id="133" name="Ink 132">
@@ -19212,8 +19213,8 @@
             </p:pic>
           </mc:Fallback>
         </mc:AlternateContent>
-        <mc:AlternateContent xmlns:mc="http://schemas.openxmlformats.org/markup-compatibility/2006">
-          <mc:Choice xmlns:p14="http://schemas.microsoft.com/office/powerpoint/2010/main" Requires="p14">
+        <mc:AlternateContent xmlns:mc="http://schemas.openxmlformats.org/markup-compatibility/2006" xmlns:p14="http://schemas.microsoft.com/office/powerpoint/2010/main">
+          <mc:Choice Requires="p14">
             <p:contentPart p14:bwMode="auto" r:id="rId208">
               <p14:nvContentPartPr>
                 <p14:cNvPr id="134" name="Ink 133">
@@ -19232,7 +19233,7 @@
               </p14:xfrm>
             </p:contentPart>
           </mc:Choice>
-          <mc:Fallback>
+          <mc:Fallback xmlns="">
             <p:pic>
               <p:nvPicPr>
                 <p:cNvPr id="134" name="Ink 133">
@@ -19263,8 +19264,8 @@
             </p:pic>
           </mc:Fallback>
         </mc:AlternateContent>
-        <mc:AlternateContent xmlns:mc="http://schemas.openxmlformats.org/markup-compatibility/2006">
-          <mc:Choice xmlns:p14="http://schemas.microsoft.com/office/powerpoint/2010/main" Requires="p14">
+        <mc:AlternateContent xmlns:mc="http://schemas.openxmlformats.org/markup-compatibility/2006" xmlns:p14="http://schemas.microsoft.com/office/powerpoint/2010/main">
+          <mc:Choice Requires="p14">
             <p:contentPart p14:bwMode="auto" r:id="rId210">
               <p14:nvContentPartPr>
                 <p14:cNvPr id="135" name="Ink 134">
@@ -19283,7 +19284,7 @@
               </p14:xfrm>
             </p:contentPart>
           </mc:Choice>
-          <mc:Fallback>
+          <mc:Fallback xmlns="">
             <p:pic>
               <p:nvPicPr>
                 <p:cNvPr id="135" name="Ink 134">
@@ -19314,8 +19315,8 @@
             </p:pic>
           </mc:Fallback>
         </mc:AlternateContent>
-        <mc:AlternateContent xmlns:mc="http://schemas.openxmlformats.org/markup-compatibility/2006">
-          <mc:Choice xmlns:p14="http://schemas.microsoft.com/office/powerpoint/2010/main" Requires="p14">
+        <mc:AlternateContent xmlns:mc="http://schemas.openxmlformats.org/markup-compatibility/2006" xmlns:p14="http://schemas.microsoft.com/office/powerpoint/2010/main">
+          <mc:Choice Requires="p14">
             <p:contentPart p14:bwMode="auto" r:id="rId212">
               <p14:nvContentPartPr>
                 <p14:cNvPr id="136" name="Ink 135">
@@ -19334,7 +19335,7 @@
               </p14:xfrm>
             </p:contentPart>
           </mc:Choice>
-          <mc:Fallback>
+          <mc:Fallback xmlns="">
             <p:pic>
               <p:nvPicPr>
                 <p:cNvPr id="136" name="Ink 135">
@@ -19365,8 +19366,8 @@
             </p:pic>
           </mc:Fallback>
         </mc:AlternateContent>
-        <mc:AlternateContent xmlns:mc="http://schemas.openxmlformats.org/markup-compatibility/2006">
-          <mc:Choice xmlns:p14="http://schemas.microsoft.com/office/powerpoint/2010/main" Requires="p14">
+        <mc:AlternateContent xmlns:mc="http://schemas.openxmlformats.org/markup-compatibility/2006" xmlns:p14="http://schemas.microsoft.com/office/powerpoint/2010/main">
+          <mc:Choice Requires="p14">
             <p:contentPart p14:bwMode="auto" r:id="rId214">
               <p14:nvContentPartPr>
                 <p14:cNvPr id="137" name="Ink 136">
@@ -19385,7 +19386,7 @@
               </p14:xfrm>
             </p:contentPart>
           </mc:Choice>
-          <mc:Fallback>
+          <mc:Fallback xmlns="">
             <p:pic>
               <p:nvPicPr>
                 <p:cNvPr id="137" name="Ink 136">
@@ -19416,8 +19417,8 @@
             </p:pic>
           </mc:Fallback>
         </mc:AlternateContent>
-        <mc:AlternateContent xmlns:mc="http://schemas.openxmlformats.org/markup-compatibility/2006">
-          <mc:Choice xmlns:p14="http://schemas.microsoft.com/office/powerpoint/2010/main" Requires="p14">
+        <mc:AlternateContent xmlns:mc="http://schemas.openxmlformats.org/markup-compatibility/2006" xmlns:p14="http://schemas.microsoft.com/office/powerpoint/2010/main">
+          <mc:Choice Requires="p14">
             <p:contentPart p14:bwMode="auto" r:id="rId216">
               <p14:nvContentPartPr>
                 <p14:cNvPr id="140" name="Ink 139">
@@ -19436,7 +19437,7 @@
               </p14:xfrm>
             </p:contentPart>
           </mc:Choice>
-          <mc:Fallback>
+          <mc:Fallback xmlns="">
             <p:pic>
               <p:nvPicPr>
                 <p:cNvPr id="140" name="Ink 139">
@@ -19467,8 +19468,8 @@
             </p:pic>
           </mc:Fallback>
         </mc:AlternateContent>
-        <mc:AlternateContent xmlns:mc="http://schemas.openxmlformats.org/markup-compatibility/2006">
-          <mc:Choice xmlns:p14="http://schemas.microsoft.com/office/powerpoint/2010/main" Requires="p14">
+        <mc:AlternateContent xmlns:mc="http://schemas.openxmlformats.org/markup-compatibility/2006" xmlns:p14="http://schemas.microsoft.com/office/powerpoint/2010/main">
+          <mc:Choice Requires="p14">
             <p:contentPart p14:bwMode="auto" r:id="rId218">
               <p14:nvContentPartPr>
                 <p14:cNvPr id="141" name="Ink 140">
@@ -19487,7 +19488,7 @@
               </p14:xfrm>
             </p:contentPart>
           </mc:Choice>
-          <mc:Fallback>
+          <mc:Fallback xmlns="">
             <p:pic>
               <p:nvPicPr>
                 <p:cNvPr id="141" name="Ink 140">
@@ -19518,8 +19519,8 @@
             </p:pic>
           </mc:Fallback>
         </mc:AlternateContent>
-        <mc:AlternateContent xmlns:mc="http://schemas.openxmlformats.org/markup-compatibility/2006">
-          <mc:Choice xmlns:p14="http://schemas.microsoft.com/office/powerpoint/2010/main" Requires="p14">
+        <mc:AlternateContent xmlns:mc="http://schemas.openxmlformats.org/markup-compatibility/2006" xmlns:p14="http://schemas.microsoft.com/office/powerpoint/2010/main">
+          <mc:Choice Requires="p14">
             <p:contentPart p14:bwMode="auto" r:id="rId220">
               <p14:nvContentPartPr>
                 <p14:cNvPr id="142" name="Ink 141">
@@ -19538,7 +19539,7 @@
               </p14:xfrm>
             </p:contentPart>
           </mc:Choice>
-          <mc:Fallback>
+          <mc:Fallback xmlns="">
             <p:pic>
               <p:nvPicPr>
                 <p:cNvPr id="142" name="Ink 141">
@@ -19569,8 +19570,8 @@
             </p:pic>
           </mc:Fallback>
         </mc:AlternateContent>
-        <mc:AlternateContent xmlns:mc="http://schemas.openxmlformats.org/markup-compatibility/2006">
-          <mc:Choice xmlns:p14="http://schemas.microsoft.com/office/powerpoint/2010/main" Requires="p14">
+        <mc:AlternateContent xmlns:mc="http://schemas.openxmlformats.org/markup-compatibility/2006" xmlns:p14="http://schemas.microsoft.com/office/powerpoint/2010/main">
+          <mc:Choice Requires="p14">
             <p:contentPart p14:bwMode="auto" r:id="rId222">
               <p14:nvContentPartPr>
                 <p14:cNvPr id="144" name="Ink 143">
@@ -19589,7 +19590,7 @@
               </p14:xfrm>
             </p:contentPart>
           </mc:Choice>
-          <mc:Fallback>
+          <mc:Fallback xmlns="">
             <p:pic>
               <p:nvPicPr>
                 <p:cNvPr id="144" name="Ink 143">
@@ -19620,8 +19621,8 @@
             </p:pic>
           </mc:Fallback>
         </mc:AlternateContent>
-        <mc:AlternateContent xmlns:mc="http://schemas.openxmlformats.org/markup-compatibility/2006">
-          <mc:Choice xmlns:p14="http://schemas.microsoft.com/office/powerpoint/2010/main" Requires="p14">
+        <mc:AlternateContent xmlns:mc="http://schemas.openxmlformats.org/markup-compatibility/2006" xmlns:p14="http://schemas.microsoft.com/office/powerpoint/2010/main">
+          <mc:Choice Requires="p14">
             <p:contentPart p14:bwMode="auto" r:id="rId224">
               <p14:nvContentPartPr>
                 <p14:cNvPr id="145" name="Ink 144">
@@ -19640,7 +19641,7 @@
               </p14:xfrm>
             </p:contentPart>
           </mc:Choice>
-          <mc:Fallback>
+          <mc:Fallback xmlns="">
             <p:pic>
               <p:nvPicPr>
                 <p:cNvPr id="145" name="Ink 144">
@@ -19671,8 +19672,8 @@
             </p:pic>
           </mc:Fallback>
         </mc:AlternateContent>
-        <mc:AlternateContent xmlns:mc="http://schemas.openxmlformats.org/markup-compatibility/2006">
-          <mc:Choice xmlns:p14="http://schemas.microsoft.com/office/powerpoint/2010/main" Requires="p14">
+        <mc:AlternateContent xmlns:mc="http://schemas.openxmlformats.org/markup-compatibility/2006" xmlns:p14="http://schemas.microsoft.com/office/powerpoint/2010/main">
+          <mc:Choice Requires="p14">
             <p:contentPart p14:bwMode="auto" r:id="rId226">
               <p14:nvContentPartPr>
                 <p14:cNvPr id="146" name="Ink 145">
@@ -19691,7 +19692,7 @@
               </p14:xfrm>
             </p:contentPart>
           </mc:Choice>
-          <mc:Fallback>
+          <mc:Fallback xmlns="">
             <p:pic>
               <p:nvPicPr>
                 <p:cNvPr id="146" name="Ink 145">
@@ -19722,8 +19723,8 @@
             </p:pic>
           </mc:Fallback>
         </mc:AlternateContent>
-        <mc:AlternateContent xmlns:mc="http://schemas.openxmlformats.org/markup-compatibility/2006">
-          <mc:Choice xmlns:p14="http://schemas.microsoft.com/office/powerpoint/2010/main" Requires="p14">
+        <mc:AlternateContent xmlns:mc="http://schemas.openxmlformats.org/markup-compatibility/2006" xmlns:p14="http://schemas.microsoft.com/office/powerpoint/2010/main">
+          <mc:Choice Requires="p14">
             <p:contentPart p14:bwMode="auto" r:id="rId228">
               <p14:nvContentPartPr>
                 <p14:cNvPr id="147" name="Ink 146">
@@ -19742,7 +19743,7 @@
               </p14:xfrm>
             </p:contentPart>
           </mc:Choice>
-          <mc:Fallback>
+          <mc:Fallback xmlns="">
             <p:pic>
               <p:nvPicPr>
                 <p:cNvPr id="147" name="Ink 146">
@@ -19773,8 +19774,8 @@
             </p:pic>
           </mc:Fallback>
         </mc:AlternateContent>
-        <mc:AlternateContent xmlns:mc="http://schemas.openxmlformats.org/markup-compatibility/2006">
-          <mc:Choice xmlns:p14="http://schemas.microsoft.com/office/powerpoint/2010/main" Requires="p14">
+        <mc:AlternateContent xmlns:mc="http://schemas.openxmlformats.org/markup-compatibility/2006" xmlns:p14="http://schemas.microsoft.com/office/powerpoint/2010/main">
+          <mc:Choice Requires="p14">
             <p:contentPart p14:bwMode="auto" r:id="rId230">
               <p14:nvContentPartPr>
                 <p14:cNvPr id="148" name="Ink 147">
@@ -19793,7 +19794,7 @@
               </p14:xfrm>
             </p:contentPart>
           </mc:Choice>
-          <mc:Fallback>
+          <mc:Fallback xmlns="">
             <p:pic>
               <p:nvPicPr>
                 <p:cNvPr id="148" name="Ink 147">
@@ -19824,8 +19825,8 @@
             </p:pic>
           </mc:Fallback>
         </mc:AlternateContent>
-        <mc:AlternateContent xmlns:mc="http://schemas.openxmlformats.org/markup-compatibility/2006">
-          <mc:Choice xmlns:p14="http://schemas.microsoft.com/office/powerpoint/2010/main" Requires="p14">
+        <mc:AlternateContent xmlns:mc="http://schemas.openxmlformats.org/markup-compatibility/2006" xmlns:p14="http://schemas.microsoft.com/office/powerpoint/2010/main">
+          <mc:Choice Requires="p14">
             <p:contentPart p14:bwMode="auto" r:id="rId232">
               <p14:nvContentPartPr>
                 <p14:cNvPr id="149" name="Ink 148">
@@ -19844,7 +19845,7 @@
               </p14:xfrm>
             </p:contentPart>
           </mc:Choice>
-          <mc:Fallback>
+          <mc:Fallback xmlns="">
             <p:pic>
               <p:nvPicPr>
                 <p:cNvPr id="149" name="Ink 148">
@@ -19875,8 +19876,8 @@
             </p:pic>
           </mc:Fallback>
         </mc:AlternateContent>
-        <mc:AlternateContent xmlns:mc="http://schemas.openxmlformats.org/markup-compatibility/2006">
-          <mc:Choice xmlns:p14="http://schemas.microsoft.com/office/powerpoint/2010/main" Requires="p14">
+        <mc:AlternateContent xmlns:mc="http://schemas.openxmlformats.org/markup-compatibility/2006" xmlns:p14="http://schemas.microsoft.com/office/powerpoint/2010/main">
+          <mc:Choice Requires="p14">
             <p:contentPart p14:bwMode="auto" r:id="rId234">
               <p14:nvContentPartPr>
                 <p14:cNvPr id="150" name="Ink 149">
@@ -19895,7 +19896,7 @@
               </p14:xfrm>
             </p:contentPart>
           </mc:Choice>
-          <mc:Fallback>
+          <mc:Fallback xmlns="">
             <p:pic>
               <p:nvPicPr>
                 <p:cNvPr id="150" name="Ink 149">
@@ -19926,8 +19927,8 @@
             </p:pic>
           </mc:Fallback>
         </mc:AlternateContent>
-        <mc:AlternateContent xmlns:mc="http://schemas.openxmlformats.org/markup-compatibility/2006">
-          <mc:Choice xmlns:p14="http://schemas.microsoft.com/office/powerpoint/2010/main" Requires="p14">
+        <mc:AlternateContent xmlns:mc="http://schemas.openxmlformats.org/markup-compatibility/2006" xmlns:p14="http://schemas.microsoft.com/office/powerpoint/2010/main">
+          <mc:Choice Requires="p14">
             <p:contentPart p14:bwMode="auto" r:id="rId236">
               <p14:nvContentPartPr>
                 <p14:cNvPr id="151" name="Ink 150">
@@ -19946,7 +19947,7 @@
               </p14:xfrm>
             </p:contentPart>
           </mc:Choice>
-          <mc:Fallback>
+          <mc:Fallback xmlns="">
             <p:pic>
               <p:nvPicPr>
                 <p:cNvPr id="151" name="Ink 150">
@@ -19977,8 +19978,8 @@
             </p:pic>
           </mc:Fallback>
         </mc:AlternateContent>
-        <mc:AlternateContent xmlns:mc="http://schemas.openxmlformats.org/markup-compatibility/2006">
-          <mc:Choice xmlns:p14="http://schemas.microsoft.com/office/powerpoint/2010/main" Requires="p14">
+        <mc:AlternateContent xmlns:mc="http://schemas.openxmlformats.org/markup-compatibility/2006" xmlns:p14="http://schemas.microsoft.com/office/powerpoint/2010/main">
+          <mc:Choice Requires="p14">
             <p:contentPart p14:bwMode="auto" r:id="rId238">
               <p14:nvContentPartPr>
                 <p14:cNvPr id="152" name="Ink 151">
@@ -19997,7 +19998,7 @@
               </p14:xfrm>
             </p:contentPart>
           </mc:Choice>
-          <mc:Fallback>
+          <mc:Fallback xmlns="">
             <p:pic>
               <p:nvPicPr>
                 <p:cNvPr id="152" name="Ink 151">
@@ -20028,8 +20029,8 @@
             </p:pic>
           </mc:Fallback>
         </mc:AlternateContent>
-        <mc:AlternateContent xmlns:mc="http://schemas.openxmlformats.org/markup-compatibility/2006">
-          <mc:Choice xmlns:p14="http://schemas.microsoft.com/office/powerpoint/2010/main" Requires="p14">
+        <mc:AlternateContent xmlns:mc="http://schemas.openxmlformats.org/markup-compatibility/2006" xmlns:p14="http://schemas.microsoft.com/office/powerpoint/2010/main">
+          <mc:Choice Requires="p14">
             <p:contentPart p14:bwMode="auto" r:id="rId240">
               <p14:nvContentPartPr>
                 <p14:cNvPr id="153" name="Ink 152">
@@ -20048,7 +20049,7 @@
               </p14:xfrm>
             </p:contentPart>
           </mc:Choice>
-          <mc:Fallback>
+          <mc:Fallback xmlns="">
             <p:pic>
               <p:nvPicPr>
                 <p:cNvPr id="153" name="Ink 152">
@@ -20079,8 +20080,8 @@
             </p:pic>
           </mc:Fallback>
         </mc:AlternateContent>
-        <mc:AlternateContent xmlns:mc="http://schemas.openxmlformats.org/markup-compatibility/2006">
-          <mc:Choice xmlns:p14="http://schemas.microsoft.com/office/powerpoint/2010/main" Requires="p14">
+        <mc:AlternateContent xmlns:mc="http://schemas.openxmlformats.org/markup-compatibility/2006" xmlns:p14="http://schemas.microsoft.com/office/powerpoint/2010/main">
+          <mc:Choice Requires="p14">
             <p:contentPart p14:bwMode="auto" r:id="rId242">
               <p14:nvContentPartPr>
                 <p14:cNvPr id="154" name="Ink 153">
@@ -20099,7 +20100,7 @@
               </p14:xfrm>
             </p:contentPart>
           </mc:Choice>
-          <mc:Fallback>
+          <mc:Fallback xmlns="">
             <p:pic>
               <p:nvPicPr>
                 <p:cNvPr id="154" name="Ink 153">
@@ -20130,8 +20131,8 @@
             </p:pic>
           </mc:Fallback>
         </mc:AlternateContent>
-        <mc:AlternateContent xmlns:mc="http://schemas.openxmlformats.org/markup-compatibility/2006">
-          <mc:Choice xmlns:p14="http://schemas.microsoft.com/office/powerpoint/2010/main" Requires="p14">
+        <mc:AlternateContent xmlns:mc="http://schemas.openxmlformats.org/markup-compatibility/2006" xmlns:p14="http://schemas.microsoft.com/office/powerpoint/2010/main">
+          <mc:Choice Requires="p14">
             <p:contentPart p14:bwMode="auto" r:id="rId244">
               <p14:nvContentPartPr>
                 <p14:cNvPr id="155" name="Ink 154">
@@ -20150,7 +20151,7 @@
               </p14:xfrm>
             </p:contentPart>
           </mc:Choice>
-          <mc:Fallback>
+          <mc:Fallback xmlns="">
             <p:pic>
               <p:nvPicPr>
                 <p:cNvPr id="155" name="Ink 154">
@@ -20181,8 +20182,8 @@
             </p:pic>
           </mc:Fallback>
         </mc:AlternateContent>
-        <mc:AlternateContent xmlns:mc="http://schemas.openxmlformats.org/markup-compatibility/2006">
-          <mc:Choice xmlns:p14="http://schemas.microsoft.com/office/powerpoint/2010/main" Requires="p14">
+        <mc:AlternateContent xmlns:mc="http://schemas.openxmlformats.org/markup-compatibility/2006" xmlns:p14="http://schemas.microsoft.com/office/powerpoint/2010/main">
+          <mc:Choice Requires="p14">
             <p:contentPart p14:bwMode="auto" r:id="rId246">
               <p14:nvContentPartPr>
                 <p14:cNvPr id="157" name="Ink 156">
@@ -20201,7 +20202,7 @@
               </p14:xfrm>
             </p:contentPart>
           </mc:Choice>
-          <mc:Fallback>
+          <mc:Fallback xmlns="">
             <p:pic>
               <p:nvPicPr>
                 <p:cNvPr id="157" name="Ink 156">
@@ -20232,8 +20233,8 @@
             </p:pic>
           </mc:Fallback>
         </mc:AlternateContent>
-        <mc:AlternateContent xmlns:mc="http://schemas.openxmlformats.org/markup-compatibility/2006">
-          <mc:Choice xmlns:p14="http://schemas.microsoft.com/office/powerpoint/2010/main" Requires="p14">
+        <mc:AlternateContent xmlns:mc="http://schemas.openxmlformats.org/markup-compatibility/2006" xmlns:p14="http://schemas.microsoft.com/office/powerpoint/2010/main">
+          <mc:Choice Requires="p14">
             <p:contentPart p14:bwMode="auto" r:id="rId248">
               <p14:nvContentPartPr>
                 <p14:cNvPr id="158" name="Ink 157">
@@ -20252,7 +20253,7 @@
               </p14:xfrm>
             </p:contentPart>
           </mc:Choice>
-          <mc:Fallback>
+          <mc:Fallback xmlns="">
             <p:pic>
               <p:nvPicPr>
                 <p:cNvPr id="158" name="Ink 157">
@@ -20283,8 +20284,8 @@
             </p:pic>
           </mc:Fallback>
         </mc:AlternateContent>
-        <mc:AlternateContent xmlns:mc="http://schemas.openxmlformats.org/markup-compatibility/2006">
-          <mc:Choice xmlns:p14="http://schemas.microsoft.com/office/powerpoint/2010/main" Requires="p14">
+        <mc:AlternateContent xmlns:mc="http://schemas.openxmlformats.org/markup-compatibility/2006" xmlns:p14="http://schemas.microsoft.com/office/powerpoint/2010/main">
+          <mc:Choice Requires="p14">
             <p:contentPart p14:bwMode="auto" r:id="rId250">
               <p14:nvContentPartPr>
                 <p14:cNvPr id="159" name="Ink 158">
@@ -20303,7 +20304,7 @@
               </p14:xfrm>
             </p:contentPart>
           </mc:Choice>
-          <mc:Fallback>
+          <mc:Fallback xmlns="">
             <p:pic>
               <p:nvPicPr>
                 <p:cNvPr id="159" name="Ink 158">
@@ -20334,8 +20335,8 @@
             </p:pic>
           </mc:Fallback>
         </mc:AlternateContent>
-        <mc:AlternateContent xmlns:mc="http://schemas.openxmlformats.org/markup-compatibility/2006">
-          <mc:Choice xmlns:p14="http://schemas.microsoft.com/office/powerpoint/2010/main" Requires="p14">
+        <mc:AlternateContent xmlns:mc="http://schemas.openxmlformats.org/markup-compatibility/2006" xmlns:p14="http://schemas.microsoft.com/office/powerpoint/2010/main">
+          <mc:Choice Requires="p14">
             <p:contentPart p14:bwMode="auto" r:id="rId252">
               <p14:nvContentPartPr>
                 <p14:cNvPr id="160" name="Ink 159">
@@ -20354,7 +20355,7 @@
               </p14:xfrm>
             </p:contentPart>
           </mc:Choice>
-          <mc:Fallback>
+          <mc:Fallback xmlns="">
             <p:pic>
               <p:nvPicPr>
                 <p:cNvPr id="160" name="Ink 159">
@@ -20390,6 +20391,122 @@
     <p:extLst>
       <p:ext uri="{BB962C8B-B14F-4D97-AF65-F5344CB8AC3E}">
         <p14:creationId xmlns:p14="http://schemas.microsoft.com/office/powerpoint/2010/main" val="882191968"/>
+      </p:ext>
+    </p:extLst>
+  </p:cSld>
+  <p:clrMapOvr>
+    <a:masterClrMapping/>
+  </p:clrMapOvr>
+</p:sld>
+</file>
+
+<file path=ppt/slides/slide6.xml><?xml version="1.0" encoding="utf-8"?>
+<p:sld xmlns:a="http://schemas.openxmlformats.org/drawingml/2006/main" xmlns:r="http://schemas.openxmlformats.org/officeDocument/2006/relationships" xmlns:p="http://schemas.openxmlformats.org/presentationml/2006/main">
+  <p:cSld>
+    <p:spTree>
+      <p:nvGrpSpPr>
+        <p:cNvPr id="1" name=""/>
+        <p:cNvGrpSpPr/>
+        <p:nvPr/>
+      </p:nvGrpSpPr>
+      <p:grpSpPr>
+        <a:xfrm>
+          <a:off x="0" y="0"/>
+          <a:ext cx="0" cy="0"/>
+          <a:chOff x="0" y="0"/>
+          <a:chExt cx="0" cy="0"/>
+        </a:xfrm>
+      </p:grpSpPr>
+      <p:sp>
+        <p:nvSpPr>
+          <p:cNvPr id="2" name="Title 1">
+            <a:extLst>
+              <a:ext uri="{FF2B5EF4-FFF2-40B4-BE49-F238E27FC236}">
+                <a16:creationId xmlns:a16="http://schemas.microsoft.com/office/drawing/2014/main" id="{85EDFE12-78E5-24FD-48E1-98E4A97C1334}"/>
+              </a:ext>
+            </a:extLst>
+          </p:cNvPr>
+          <p:cNvSpPr>
+            <a:spLocks noGrp="1"/>
+          </p:cNvSpPr>
+          <p:nvPr>
+            <p:ph type="title"/>
+          </p:nvPr>
+        </p:nvSpPr>
+        <p:spPr/>
+        <p:txBody>
+          <a:bodyPr/>
+          <a:lstStyle/>
+          <a:p>
+            <a:r>
+              <a:rPr lang="en-US" dirty="0"/>
+              <a:t>N.E.R.T.I.E.</a:t>
+            </a:r>
+          </a:p>
+        </p:txBody>
+      </p:sp>
+      <p:sp>
+        <p:nvSpPr>
+          <p:cNvPr id="3" name="Content Placeholder 2">
+            <a:extLst>
+              <a:ext uri="{FF2B5EF4-FFF2-40B4-BE49-F238E27FC236}">
+                <a16:creationId xmlns:a16="http://schemas.microsoft.com/office/drawing/2014/main" id="{5B89544C-A4AB-35D7-A1B3-C92121E0FB8A}"/>
+              </a:ext>
+            </a:extLst>
+          </p:cNvPr>
+          <p:cNvSpPr>
+            <a:spLocks noGrp="1"/>
+          </p:cNvSpPr>
+          <p:nvPr>
+            <p:ph idx="1"/>
+          </p:nvPr>
+        </p:nvSpPr>
+        <p:spPr/>
+        <p:txBody>
+          <a:bodyPr/>
+          <a:lstStyle/>
+          <a:p>
+            <a:r>
+              <a:rPr lang="en-US" dirty="0"/>
+              <a:t>Nutrition</a:t>
+            </a:r>
+          </a:p>
+          <a:p>
+            <a:r>
+              <a:rPr lang="en-US" dirty="0"/>
+              <a:t>Exercise</a:t>
+            </a:r>
+          </a:p>
+          <a:p>
+            <a:r>
+              <a:rPr lang="en-US" dirty="0"/>
+              <a:t>Rest</a:t>
+            </a:r>
+          </a:p>
+          <a:p>
+            <a:r>
+              <a:rPr lang="en-US" dirty="0"/>
+              <a:t>Time</a:t>
+            </a:r>
+          </a:p>
+          <a:p>
+            <a:r>
+              <a:rPr lang="en-US" dirty="0"/>
+              <a:t>Iteration / Isolation</a:t>
+            </a:r>
+          </a:p>
+          <a:p>
+            <a:r>
+              <a:rPr lang="en-US" dirty="0"/>
+              <a:t>Extension</a:t>
+            </a:r>
+          </a:p>
+        </p:txBody>
+      </p:sp>
+    </p:spTree>
+    <p:extLst>
+      <p:ext uri="{BB962C8B-B14F-4D97-AF65-F5344CB8AC3E}">
+        <p14:creationId xmlns:p14="http://schemas.microsoft.com/office/powerpoint/2010/main" val="3197680042"/>
       </p:ext>
     </p:extLst>
   </p:cSld>

</xml_diff>